<commit_message>
Pushing Vision ppt slide.
</commit_message>
<xml_diff>
--- a/LCO_Brief_Placeholder/SEFornofCompiling1.pptx
+++ b/LCO_Brief_Placeholder/SEFornofCompiling1.pptx
@@ -5,11 +5,10 @@
     <p:sldMasterId id="2147483648" r:id="rId1"/>
   </p:sldMasterIdLst>
   <p:notesMasterIdLst>
-    <p:notesMasterId r:id="rId4"/>
+    <p:notesMasterId r:id="rId3"/>
   </p:notesMasterIdLst>
   <p:sldIdLst>
-    <p:sldId id="256" r:id="rId2"/>
-    <p:sldId id="257" r:id="rId3"/>
+    <p:sldId id="257" r:id="rId2"/>
   </p:sldIdLst>
   <p:sldSz cx="9144000" cy="6858000" type="screen4x3"/>
   <p:notesSz cx="6858000" cy="9144000"/>
@@ -872,7 +871,7 @@
         </a:p>
       </dgm:t>
     </dgm:pt>
-    <dgm:pt modelId="{1B005DB3-472B-448A-A805-4599A19C9C07}">
+    <dgm:pt modelId="{A79B687B-16F5-470E-B1E1-DDBBBC759246}">
       <dgm:prSet phldrT="[Text]"/>
       <dgm:spPr/>
       <dgm:t>
@@ -881,13 +880,13 @@
         <a:p>
           <a:r>
             <a:rPr lang="en-US" dirty="0" smtClean="0"/>
-            <a:t>test</a:t>
+            <a:t>Give the knowledge of Buses (for the passenger)</a:t>
           </a:r>
           <a:endParaRPr lang="en-US" dirty="0"/>
         </a:p>
       </dgm:t>
     </dgm:pt>
-    <dgm:pt modelId="{F4A230F2-CD59-466D-B1EC-541C1566173E}" type="parTrans" cxnId="{94FF39BA-5FFE-4D32-ABF2-682A19D6FB53}">
+    <dgm:pt modelId="{8F5F3ABD-0363-4FC6-8CEF-FA1CEC06B118}" type="parTrans" cxnId="{A62F5636-8873-4A00-B2A5-B4F17579FE36}">
       <dgm:prSet/>
       <dgm:spPr/>
       <dgm:t>
@@ -898,7 +897,7 @@
         </a:p>
       </dgm:t>
     </dgm:pt>
-    <dgm:pt modelId="{C4D2CACD-38DB-4B7E-92F1-CDD2B8F74E56}" type="sibTrans" cxnId="{94FF39BA-5FFE-4D32-ABF2-682A19D6FB53}">
+    <dgm:pt modelId="{12F2915A-89C9-40ED-9C3D-D3858DAD886B}" type="sibTrans" cxnId="{A62F5636-8873-4A00-B2A5-B4F17579FE36}">
       <dgm:prSet/>
       <dgm:spPr/>
       <dgm:t>
@@ -909,18 +908,22 @@
         </a:p>
       </dgm:t>
     </dgm:pt>
-    <dgm:pt modelId="{0F8B1829-5C53-4B41-9E98-E1669609B844}">
-      <dgm:prSet phldrT="[Text]" phldr="1"/>
+    <dgm:pt modelId="{8F322683-765E-42B1-A75C-81444315BF76}">
+      <dgm:prSet/>
       <dgm:spPr/>
       <dgm:t>
         <a:bodyPr/>
         <a:lstStyle/>
         <a:p>
-          <a:endParaRPr lang="en-US"/>
+          <a:r>
+            <a:rPr lang="en-US" dirty="0" smtClean="0"/>
+            <a:t>When last bus left. </a:t>
+          </a:r>
+          <a:endParaRPr lang="en-US" dirty="0"/>
         </a:p>
       </dgm:t>
     </dgm:pt>
-    <dgm:pt modelId="{5E0DB286-3820-4612-A2D1-0AA670561D84}" type="parTrans" cxnId="{5D65D43C-DB04-4481-87F4-9F469B028029}">
+    <dgm:pt modelId="{0B575106-E1FA-4406-BDC4-5EFECD2D2599}" type="parTrans" cxnId="{C350D824-2C13-4E3A-997A-1A523B9511A8}">
       <dgm:prSet/>
       <dgm:spPr/>
       <dgm:t>
@@ -931,7 +934,7 @@
         </a:p>
       </dgm:t>
     </dgm:pt>
-    <dgm:pt modelId="{AA61016F-FA5F-490E-A274-365467364A3E}" type="sibTrans" cxnId="{5D65D43C-DB04-4481-87F4-9F469B028029}">
+    <dgm:pt modelId="{79213D30-29A6-4ACB-AE30-7A15FE1C420B}" type="sibTrans" cxnId="{C350D824-2C13-4E3A-997A-1A523B9511A8}">
       <dgm:prSet/>
       <dgm:spPr/>
       <dgm:t>
@@ -942,18 +945,22 @@
         </a:p>
       </dgm:t>
     </dgm:pt>
-    <dgm:pt modelId="{D519245D-39A6-4165-82D6-20F5DA8396AA}">
-      <dgm:prSet phldrT="[Text]" phldr="1"/>
+    <dgm:pt modelId="{06292A25-5896-4266-B197-81F09BCCA07F}">
+      <dgm:prSet/>
       <dgm:spPr/>
       <dgm:t>
         <a:bodyPr/>
         <a:lstStyle/>
         <a:p>
-          <a:endParaRPr lang="en-US"/>
+          <a:r>
+            <a:rPr lang="en-US" dirty="0" smtClean="0"/>
+            <a:t>When the next bus is due.</a:t>
+          </a:r>
+          <a:endParaRPr lang="en-US" dirty="0"/>
         </a:p>
       </dgm:t>
     </dgm:pt>
-    <dgm:pt modelId="{4702B203-45CE-4B12-89B4-48560F26287E}" type="parTrans" cxnId="{E43183C2-0BC6-4567-8D16-1C791778F61A}">
+    <dgm:pt modelId="{60C3E475-02BE-441C-8E05-B041E32248B5}" type="parTrans" cxnId="{390C6916-F60C-41EE-9586-6DB0C647DE84}">
       <dgm:prSet/>
       <dgm:spPr/>
       <dgm:t>
@@ -964,7 +971,422 @@
         </a:p>
       </dgm:t>
     </dgm:pt>
-    <dgm:pt modelId="{A57CD843-16C1-425E-95E9-9DA954EB8AE0}" type="sibTrans" cxnId="{E43183C2-0BC6-4567-8D16-1C791778F61A}">
+    <dgm:pt modelId="{CF8A5CD1-0E24-4130-B4C2-0D32F0BC82A5}" type="sibTrans" cxnId="{390C6916-F60C-41EE-9586-6DB0C647DE84}">
+      <dgm:prSet/>
+      <dgm:spPr/>
+      <dgm:t>
+        <a:bodyPr/>
+        <a:lstStyle/>
+        <a:p>
+          <a:endParaRPr lang="en-US"/>
+        </a:p>
+      </dgm:t>
+    </dgm:pt>
+    <dgm:pt modelId="{CC0BFA8C-A841-4500-B8D7-201A1A7376D8}">
+      <dgm:prSet/>
+      <dgm:spPr/>
+      <dgm:t>
+        <a:bodyPr/>
+        <a:lstStyle/>
+        <a:p>
+          <a:r>
+            <a:rPr lang="en-US" dirty="0" smtClean="0"/>
+            <a:t>Provide </a:t>
+          </a:r>
+          <a:r>
+            <a:rPr lang="en-US" i="1" dirty="0" smtClean="0"/>
+            <a:t>Passenger Information </a:t>
+          </a:r>
+          <a:r>
+            <a:rPr lang="en-US" dirty="0" smtClean="0"/>
+            <a:t>(for the administrators). </a:t>
+          </a:r>
+          <a:endParaRPr lang="en-US" dirty="0"/>
+        </a:p>
+      </dgm:t>
+    </dgm:pt>
+    <dgm:pt modelId="{59D9C842-8016-4103-A7B1-59F66A41FAE7}" type="parTrans" cxnId="{A4FB456E-DD9B-4B48-BF71-057E54B8C07E}">
+      <dgm:prSet/>
+      <dgm:spPr/>
+      <dgm:t>
+        <a:bodyPr/>
+        <a:lstStyle/>
+        <a:p>
+          <a:endParaRPr lang="en-US"/>
+        </a:p>
+      </dgm:t>
+    </dgm:pt>
+    <dgm:pt modelId="{2EF7ADB2-E6A7-4FEA-975B-443D056C2361}" type="sibTrans" cxnId="{A4FB456E-DD9B-4B48-BF71-057E54B8C07E}">
+      <dgm:prSet/>
+      <dgm:spPr/>
+      <dgm:t>
+        <a:bodyPr/>
+        <a:lstStyle/>
+        <a:p>
+          <a:endParaRPr lang="en-US"/>
+        </a:p>
+      </dgm:t>
+    </dgm:pt>
+    <dgm:pt modelId="{0B0E9FB8-1BAF-46CE-A5CB-78118DB90488}">
+      <dgm:prSet/>
+      <dgm:spPr/>
+      <dgm:t>
+        <a:bodyPr/>
+        <a:lstStyle/>
+        <a:p>
+          <a:r>
+            <a:rPr lang="en-US" dirty="0" smtClean="0"/>
+            <a:t>How many potential passengers are at the stops?</a:t>
+          </a:r>
+          <a:endParaRPr lang="en-US" dirty="0"/>
+        </a:p>
+      </dgm:t>
+    </dgm:pt>
+    <dgm:pt modelId="{77B75B0C-4A9E-405B-9DF8-930836986EE0}" type="parTrans" cxnId="{8EEF90AB-47D2-4D62-9D48-C32A325EACA1}">
+      <dgm:prSet/>
+      <dgm:spPr/>
+      <dgm:t>
+        <a:bodyPr/>
+        <a:lstStyle/>
+        <a:p>
+          <a:endParaRPr lang="en-US"/>
+        </a:p>
+      </dgm:t>
+    </dgm:pt>
+    <dgm:pt modelId="{C6DA572D-8BFD-47E6-BD72-C29630668D8B}" type="sibTrans" cxnId="{8EEF90AB-47D2-4D62-9D48-C32A325EACA1}">
+      <dgm:prSet/>
+      <dgm:spPr/>
+      <dgm:t>
+        <a:bodyPr/>
+        <a:lstStyle/>
+        <a:p>
+          <a:endParaRPr lang="en-US"/>
+        </a:p>
+      </dgm:t>
+    </dgm:pt>
+    <dgm:pt modelId="{C116615E-76FC-47A8-8F14-9A3FA8207BA6}">
+      <dgm:prSet/>
+      <dgm:spPr/>
+      <dgm:t>
+        <a:bodyPr/>
+        <a:lstStyle/>
+        <a:p>
+          <a:r>
+            <a:rPr lang="en-US" dirty="0" smtClean="0"/>
+            <a:t>How many passengers are on the buses ?</a:t>
+          </a:r>
+          <a:endParaRPr lang="en-US" dirty="0"/>
+        </a:p>
+      </dgm:t>
+    </dgm:pt>
+    <dgm:pt modelId="{541796EF-49FC-4E4D-8342-8A6E52FD79CB}" type="parTrans" cxnId="{75C5A216-1F17-44D0-B2B5-70A9681952FD}">
+      <dgm:prSet/>
+      <dgm:spPr/>
+      <dgm:t>
+        <a:bodyPr/>
+        <a:lstStyle/>
+        <a:p>
+          <a:endParaRPr lang="en-US"/>
+        </a:p>
+      </dgm:t>
+    </dgm:pt>
+    <dgm:pt modelId="{8F61520D-9E1F-4ACC-A66E-96FFA9882257}" type="sibTrans" cxnId="{75C5A216-1F17-44D0-B2B5-70A9681952FD}">
+      <dgm:prSet/>
+      <dgm:spPr/>
+      <dgm:t>
+        <a:bodyPr/>
+        <a:lstStyle/>
+        <a:p>
+          <a:endParaRPr lang="en-US"/>
+        </a:p>
+      </dgm:t>
+    </dgm:pt>
+    <dgm:pt modelId="{EEA9A094-4BCC-4FBF-A54D-FFD01ECE375F}">
+      <dgm:prSet phldrT="[Text]"/>
+      <dgm:spPr/>
+      <dgm:t>
+        <a:bodyPr/>
+        <a:lstStyle/>
+        <a:p>
+          <a:r>
+            <a:rPr lang="en-US" dirty="0" smtClean="0"/>
+            <a:t>The vision document  Contains the general ideas of :</a:t>
+          </a:r>
+          <a:endParaRPr lang="en-US" dirty="0"/>
+        </a:p>
+      </dgm:t>
+    </dgm:pt>
+    <dgm:pt modelId="{16860955-36AE-471A-A212-45BB9F2B11EE}" type="parTrans" cxnId="{E7F88F65-7DCD-48EC-8F7A-FA40D9A0CF02}">
+      <dgm:prSet/>
+      <dgm:spPr/>
+      <dgm:t>
+        <a:bodyPr/>
+        <a:lstStyle/>
+        <a:p>
+          <a:endParaRPr lang="en-US"/>
+        </a:p>
+      </dgm:t>
+    </dgm:pt>
+    <dgm:pt modelId="{EB1D4B32-2FCD-41C2-B6D7-1E3687B33873}" type="sibTrans" cxnId="{E7F88F65-7DCD-48EC-8F7A-FA40D9A0CF02}">
+      <dgm:prSet/>
+      <dgm:spPr/>
+      <dgm:t>
+        <a:bodyPr/>
+        <a:lstStyle/>
+        <a:p>
+          <a:endParaRPr lang="en-US"/>
+        </a:p>
+      </dgm:t>
+    </dgm:pt>
+    <dgm:pt modelId="{91A28DF5-1C26-419C-8784-7E7B4F9BA472}">
+      <dgm:prSet phldrT="[Text]"/>
+      <dgm:spPr/>
+      <dgm:t>
+        <a:bodyPr/>
+        <a:lstStyle/>
+        <a:p>
+          <a:r>
+            <a:rPr lang="en-US" dirty="0" smtClean="0"/>
+            <a:t>who the stakeholders are and what they want</a:t>
+          </a:r>
+          <a:endParaRPr lang="en-US" dirty="0"/>
+        </a:p>
+      </dgm:t>
+    </dgm:pt>
+    <dgm:pt modelId="{7B31307C-B2A4-4971-BBEB-BFC4823C2B32}" type="parTrans" cxnId="{FEAAAD9C-7FA8-4249-8D90-164BB35F1A40}">
+      <dgm:prSet/>
+      <dgm:spPr/>
+      <dgm:t>
+        <a:bodyPr/>
+        <a:lstStyle/>
+        <a:p>
+          <a:endParaRPr lang="en-US"/>
+        </a:p>
+      </dgm:t>
+    </dgm:pt>
+    <dgm:pt modelId="{BE714A8F-10D8-488B-AEB5-09F91BC0AD6C}" type="sibTrans" cxnId="{FEAAAD9C-7FA8-4249-8D90-164BB35F1A40}">
+      <dgm:prSet/>
+      <dgm:spPr/>
+      <dgm:t>
+        <a:bodyPr/>
+        <a:lstStyle/>
+        <a:p>
+          <a:endParaRPr lang="en-US"/>
+        </a:p>
+      </dgm:t>
+    </dgm:pt>
+    <dgm:pt modelId="{FC6E38C2-630D-4072-BAC8-3EAAF35965C2}">
+      <dgm:prSet phldrT="[Text]"/>
+      <dgm:spPr/>
+      <dgm:t>
+        <a:bodyPr/>
+        <a:lstStyle/>
+        <a:p>
+          <a:r>
+            <a:rPr lang="en-US" dirty="0" smtClean="0"/>
+            <a:t>Who the passengers are and what they want</a:t>
+          </a:r>
+          <a:endParaRPr lang="en-US" dirty="0"/>
+        </a:p>
+      </dgm:t>
+    </dgm:pt>
+    <dgm:pt modelId="{33DD31CC-2747-44DD-A73E-EFFA98E07034}" type="parTrans" cxnId="{788086F2-BF7B-4FD7-82D3-D95C82BEFFF4}">
+      <dgm:prSet/>
+      <dgm:spPr/>
+      <dgm:t>
+        <a:bodyPr/>
+        <a:lstStyle/>
+        <a:p>
+          <a:endParaRPr lang="en-US"/>
+        </a:p>
+      </dgm:t>
+    </dgm:pt>
+    <dgm:pt modelId="{7D67218A-657E-4C7C-BF21-E9E924EB1097}" type="sibTrans" cxnId="{788086F2-BF7B-4FD7-82D3-D95C82BEFFF4}">
+      <dgm:prSet/>
+      <dgm:spPr/>
+      <dgm:t>
+        <a:bodyPr/>
+        <a:lstStyle/>
+        <a:p>
+          <a:endParaRPr lang="en-US"/>
+        </a:p>
+      </dgm:t>
+    </dgm:pt>
+    <dgm:pt modelId="{432F55CD-36FD-4AEE-96AA-D68DA8DE786D}">
+      <dgm:prSet phldrT="[Text]"/>
+      <dgm:spPr/>
+      <dgm:t>
+        <a:bodyPr/>
+        <a:lstStyle/>
+        <a:p>
+          <a:r>
+            <a:rPr lang="en-US" dirty="0" smtClean="0"/>
+            <a:t>How our solution will help them with their problem .</a:t>
+          </a:r>
+          <a:endParaRPr lang="en-US" dirty="0"/>
+        </a:p>
+      </dgm:t>
+    </dgm:pt>
+    <dgm:pt modelId="{4756E7C2-6CDC-45D2-A477-B22D93AA8788}" type="parTrans" cxnId="{9164DFB0-A2CE-4F2E-8E11-79AB81BEEE9B}">
+      <dgm:prSet/>
+      <dgm:spPr/>
+      <dgm:t>
+        <a:bodyPr/>
+        <a:lstStyle/>
+        <a:p>
+          <a:endParaRPr lang="en-US"/>
+        </a:p>
+      </dgm:t>
+    </dgm:pt>
+    <dgm:pt modelId="{A2C8CBB2-D525-4393-8211-4E3400CADD65}" type="sibTrans" cxnId="{9164DFB0-A2CE-4F2E-8E11-79AB81BEEE9B}">
+      <dgm:prSet/>
+      <dgm:spPr/>
+      <dgm:t>
+        <a:bodyPr/>
+        <a:lstStyle/>
+        <a:p>
+          <a:endParaRPr lang="en-US"/>
+        </a:p>
+      </dgm:t>
+    </dgm:pt>
+    <dgm:pt modelId="{B1E6CD13-531E-4BDF-B9E5-E32CB9CC3258}">
+      <dgm:prSet phldrT="[Text]"/>
+      <dgm:spPr/>
+      <dgm:t>
+        <a:bodyPr/>
+        <a:lstStyle/>
+        <a:p>
+          <a:r>
+            <a:rPr lang="en-US" dirty="0" smtClean="0"/>
+            <a:t>The main Issue:</a:t>
+          </a:r>
+          <a:endParaRPr lang="en-US" dirty="0"/>
+        </a:p>
+      </dgm:t>
+    </dgm:pt>
+    <dgm:pt modelId="{941474AB-D886-425E-98A8-D34211947215}" type="parTrans" cxnId="{98D971E4-4A4E-400B-93A4-027314A4D2FE}">
+      <dgm:prSet/>
+      <dgm:spPr/>
+      <dgm:t>
+        <a:bodyPr/>
+        <a:lstStyle/>
+        <a:p>
+          <a:endParaRPr lang="en-US"/>
+        </a:p>
+      </dgm:t>
+    </dgm:pt>
+    <dgm:pt modelId="{AAD09A79-83F3-4EB2-AAA2-3CC3051C49CD}" type="sibTrans" cxnId="{98D971E4-4A4E-400B-93A4-027314A4D2FE}">
+      <dgm:prSet/>
+      <dgm:spPr/>
+      <dgm:t>
+        <a:bodyPr/>
+        <a:lstStyle/>
+        <a:p>
+          <a:endParaRPr lang="en-US"/>
+        </a:p>
+      </dgm:t>
+    </dgm:pt>
+    <dgm:pt modelId="{03F5AD9C-8F8A-4E16-80BF-E2CF70BA5975}">
+      <dgm:prSet phldrT="[Text]"/>
+      <dgm:spPr/>
+      <dgm:t>
+        <a:bodyPr/>
+        <a:lstStyle/>
+        <a:p>
+          <a:r>
+            <a:rPr lang="en-US" dirty="0" smtClean="0"/>
+            <a:t> the buses are not as reliable as needed by the passengers </a:t>
+          </a:r>
+          <a:endParaRPr lang="en-US" dirty="0"/>
+        </a:p>
+      </dgm:t>
+    </dgm:pt>
+    <dgm:pt modelId="{0E99BDD7-8DA1-41AD-9F18-A022A3F6901C}" type="parTrans" cxnId="{103175FB-6E75-49FA-95F5-305C9594ED1D}">
+      <dgm:prSet/>
+      <dgm:spPr/>
+      <dgm:t>
+        <a:bodyPr/>
+        <a:lstStyle/>
+        <a:p>
+          <a:endParaRPr lang="en-US"/>
+        </a:p>
+      </dgm:t>
+    </dgm:pt>
+    <dgm:pt modelId="{20338D45-8836-49BF-A5A6-C5FD20E83EB9}" type="sibTrans" cxnId="{103175FB-6E75-49FA-95F5-305C9594ED1D}">
+      <dgm:prSet/>
+      <dgm:spPr/>
+      <dgm:t>
+        <a:bodyPr/>
+        <a:lstStyle/>
+        <a:p>
+          <a:endParaRPr lang="en-US"/>
+        </a:p>
+      </dgm:t>
+    </dgm:pt>
+    <dgm:pt modelId="{CCD6F4D9-E580-44CE-B9EC-B85FAB15514D}">
+      <dgm:prSet phldrT="[Text]"/>
+      <dgm:spPr/>
+      <dgm:t>
+        <a:bodyPr/>
+        <a:lstStyle/>
+        <a:p>
+          <a:r>
+            <a:rPr lang="en-US" dirty="0" smtClean="0"/>
+            <a:t>The Solution :</a:t>
+          </a:r>
+          <a:endParaRPr lang="en-US" dirty="0"/>
+        </a:p>
+      </dgm:t>
+    </dgm:pt>
+    <dgm:pt modelId="{BF5F8383-3A23-41F1-856F-2AAE6E3EB5E9}" type="parTrans" cxnId="{46A8BE55-ACB9-44F9-BF54-0060DB78B0DC}">
+      <dgm:prSet/>
+      <dgm:spPr/>
+      <dgm:t>
+        <a:bodyPr/>
+        <a:lstStyle/>
+        <a:p>
+          <a:endParaRPr lang="en-US"/>
+        </a:p>
+      </dgm:t>
+    </dgm:pt>
+    <dgm:pt modelId="{B9986600-715A-4FE9-A774-CA5E44E9E476}" type="sibTrans" cxnId="{46A8BE55-ACB9-44F9-BF54-0060DB78B0DC}">
+      <dgm:prSet/>
+      <dgm:spPr/>
+      <dgm:t>
+        <a:bodyPr/>
+        <a:lstStyle/>
+        <a:p>
+          <a:endParaRPr lang="en-US"/>
+        </a:p>
+      </dgm:t>
+    </dgm:pt>
+    <dgm:pt modelId="{1BB80CA9-DA5D-4BFB-ABA8-D9520179DED6}">
+      <dgm:prSet phldrT="[Text]"/>
+      <dgm:spPr/>
+      <dgm:t>
+        <a:bodyPr/>
+        <a:lstStyle/>
+        <a:p>
+          <a:r>
+            <a:rPr lang="en-US" dirty="0" smtClean="0"/>
+            <a:t>Create a program that will do the following : </a:t>
+          </a:r>
+          <a:endParaRPr lang="en-US" dirty="0"/>
+        </a:p>
+      </dgm:t>
+    </dgm:pt>
+    <dgm:pt modelId="{F76A7D89-7813-4ABF-9B6F-D527612490C3}" type="parTrans" cxnId="{A0EBA1AD-BE9A-4F55-925A-8DE621D3979A}">
+      <dgm:prSet/>
+      <dgm:spPr/>
+      <dgm:t>
+        <a:bodyPr/>
+        <a:lstStyle/>
+        <a:p>
+          <a:endParaRPr lang="en-US"/>
+        </a:p>
+      </dgm:t>
+    </dgm:pt>
+    <dgm:pt modelId="{16E2B7EC-8443-45FA-A4CF-0F51B0591AED}" type="sibTrans" cxnId="{A0EBA1AD-BE9A-4F55-925A-8DE621D3979A}">
       <dgm:prSet/>
       <dgm:spPr/>
       <dgm:t>
@@ -984,131 +1406,345 @@
         </dgm:presLayoutVars>
       </dgm:prSet>
       <dgm:spPr/>
+      <dgm:t>
+        <a:bodyPr/>
+        <a:lstStyle/>
+        <a:p>
+          <a:endParaRPr lang="en-US"/>
+        </a:p>
+      </dgm:t>
     </dgm:pt>
-    <dgm:pt modelId="{DFBCA64A-4D89-4308-B223-38355C7B62B8}" type="pres">
-      <dgm:prSet presAssocID="{1B005DB3-472B-448A-A805-4599A19C9C07}" presName="parentLin" presStyleCnt="0"/>
+    <dgm:pt modelId="{677FD4AD-08F3-47C0-B43D-83F7FA09DED9}" type="pres">
+      <dgm:prSet presAssocID="{EEA9A094-4BCC-4FBF-A54D-FFD01ECE375F}" presName="parentLin" presStyleCnt="0"/>
       <dgm:spPr/>
     </dgm:pt>
-    <dgm:pt modelId="{30E9498D-298F-450B-858D-4C317E14DB24}" type="pres">
-      <dgm:prSet presAssocID="{1B005DB3-472B-448A-A805-4599A19C9C07}" presName="parentLeftMargin" presStyleLbl="node1" presStyleIdx="0" presStyleCnt="3"/>
+    <dgm:pt modelId="{CD3AD136-FE6A-45E9-A8EF-EB1FB07FA1B0}" type="pres">
+      <dgm:prSet presAssocID="{EEA9A094-4BCC-4FBF-A54D-FFD01ECE375F}" presName="parentLeftMargin" presStyleLbl="node1" presStyleIdx="0" presStyleCnt="5"/>
       <dgm:spPr/>
+      <dgm:t>
+        <a:bodyPr/>
+        <a:lstStyle/>
+        <a:p>
+          <a:endParaRPr lang="en-US"/>
+        </a:p>
+      </dgm:t>
     </dgm:pt>
-    <dgm:pt modelId="{3E994891-3FC7-4508-AA2C-6529F3B7F173}" type="pres">
-      <dgm:prSet presAssocID="{1B005DB3-472B-448A-A805-4599A19C9C07}" presName="parentText" presStyleLbl="node1" presStyleIdx="0" presStyleCnt="3">
+    <dgm:pt modelId="{6C8870DD-F868-4EFE-974A-688CD09E4B30}" type="pres">
+      <dgm:prSet presAssocID="{EEA9A094-4BCC-4FBF-A54D-FFD01ECE375F}" presName="parentText" presStyleLbl="node1" presStyleIdx="0" presStyleCnt="5" custLinFactNeighborX="3093" custLinFactNeighborY="2033">
         <dgm:presLayoutVars>
           <dgm:chMax val="0"/>
           <dgm:bulletEnabled val="1"/>
         </dgm:presLayoutVars>
       </dgm:prSet>
       <dgm:spPr/>
+      <dgm:t>
+        <a:bodyPr/>
+        <a:lstStyle/>
+        <a:p>
+          <a:endParaRPr lang="en-US"/>
+        </a:p>
+      </dgm:t>
     </dgm:pt>
-    <dgm:pt modelId="{0AB53A35-9F54-4C1A-BFDC-AB41349D5C21}" type="pres">
-      <dgm:prSet presAssocID="{1B005DB3-472B-448A-A805-4599A19C9C07}" presName="negativeSpace" presStyleCnt="0"/>
+    <dgm:pt modelId="{5FEBAA16-1883-4761-927B-F038586C5999}" type="pres">
+      <dgm:prSet presAssocID="{EEA9A094-4BCC-4FBF-A54D-FFD01ECE375F}" presName="negativeSpace" presStyleCnt="0"/>
       <dgm:spPr/>
     </dgm:pt>
-    <dgm:pt modelId="{F25EA0A9-B79F-4A26-8FB8-EC72DD6C8279}" type="pres">
-      <dgm:prSet presAssocID="{1B005DB3-472B-448A-A805-4599A19C9C07}" presName="childText" presStyleLbl="conFgAcc1" presStyleIdx="0" presStyleCnt="3">
+    <dgm:pt modelId="{F4F3316C-7C9E-477A-95CC-6FAD826AC78D}" type="pres">
+      <dgm:prSet presAssocID="{EEA9A094-4BCC-4FBF-A54D-FFD01ECE375F}" presName="childText" presStyleLbl="conFgAcc1" presStyleIdx="0" presStyleCnt="5">
         <dgm:presLayoutVars>
           <dgm:bulletEnabled val="1"/>
         </dgm:presLayoutVars>
       </dgm:prSet>
       <dgm:spPr/>
+      <dgm:t>
+        <a:bodyPr/>
+        <a:lstStyle/>
+        <a:p>
+          <a:endParaRPr lang="en-US"/>
+        </a:p>
+      </dgm:t>
     </dgm:pt>
-    <dgm:pt modelId="{5ED15094-D8FB-4D97-BE67-0A75E75EE816}" type="pres">
-      <dgm:prSet presAssocID="{C4D2CACD-38DB-4B7E-92F1-CDD2B8F74E56}" presName="spaceBetweenRectangles" presStyleCnt="0"/>
+    <dgm:pt modelId="{4E058239-01D3-4FB7-B140-9866AEABDE89}" type="pres">
+      <dgm:prSet presAssocID="{EB1D4B32-2FCD-41C2-B6D7-1E3687B33873}" presName="spaceBetweenRectangles" presStyleCnt="0"/>
       <dgm:spPr/>
     </dgm:pt>
-    <dgm:pt modelId="{3B15655F-7B93-4034-9E76-FD2B4A677A1F}" type="pres">
-      <dgm:prSet presAssocID="{0F8B1829-5C53-4B41-9E98-E1669609B844}" presName="parentLin" presStyleCnt="0"/>
+    <dgm:pt modelId="{7B0C6284-33F9-43F4-B7E4-38E92E241623}" type="pres">
+      <dgm:prSet presAssocID="{B1E6CD13-531E-4BDF-B9E5-E32CB9CC3258}" presName="parentLin" presStyleCnt="0"/>
       <dgm:spPr/>
     </dgm:pt>
-    <dgm:pt modelId="{A5EFF379-9116-479F-81BA-041B9ED680BF}" type="pres">
-      <dgm:prSet presAssocID="{0F8B1829-5C53-4B41-9E98-E1669609B844}" presName="parentLeftMargin" presStyleLbl="node1" presStyleIdx="0" presStyleCnt="3"/>
+    <dgm:pt modelId="{5E486EC8-A0F0-401E-97A1-772E5AF10D9A}" type="pres">
+      <dgm:prSet presAssocID="{B1E6CD13-531E-4BDF-B9E5-E32CB9CC3258}" presName="parentLeftMargin" presStyleLbl="node1" presStyleIdx="0" presStyleCnt="5"/>
       <dgm:spPr/>
+      <dgm:t>
+        <a:bodyPr/>
+        <a:lstStyle/>
+        <a:p>
+          <a:endParaRPr lang="en-US"/>
+        </a:p>
+      </dgm:t>
     </dgm:pt>
-    <dgm:pt modelId="{C73A8D99-D548-4FBA-90A5-1413658EED22}" type="pres">
-      <dgm:prSet presAssocID="{0F8B1829-5C53-4B41-9E98-E1669609B844}" presName="parentText" presStyleLbl="node1" presStyleIdx="1" presStyleCnt="3">
+    <dgm:pt modelId="{00413630-CD6F-4285-B5A4-275B8238A3C6}" type="pres">
+      <dgm:prSet presAssocID="{B1E6CD13-531E-4BDF-B9E5-E32CB9CC3258}" presName="parentText" presStyleLbl="node1" presStyleIdx="1" presStyleCnt="5">
         <dgm:presLayoutVars>
           <dgm:chMax val="0"/>
           <dgm:bulletEnabled val="1"/>
         </dgm:presLayoutVars>
       </dgm:prSet>
       <dgm:spPr/>
+      <dgm:t>
+        <a:bodyPr/>
+        <a:lstStyle/>
+        <a:p>
+          <a:endParaRPr lang="en-US"/>
+        </a:p>
+      </dgm:t>
     </dgm:pt>
-    <dgm:pt modelId="{66D626D8-4DE6-40EC-A0D7-3CA5EB467E92}" type="pres">
-      <dgm:prSet presAssocID="{0F8B1829-5C53-4B41-9E98-E1669609B844}" presName="negativeSpace" presStyleCnt="0"/>
+    <dgm:pt modelId="{C0BFA1ED-C4DC-49DA-98B1-F246F407008F}" type="pres">
+      <dgm:prSet presAssocID="{B1E6CD13-531E-4BDF-B9E5-E32CB9CC3258}" presName="negativeSpace" presStyleCnt="0"/>
       <dgm:spPr/>
     </dgm:pt>
-    <dgm:pt modelId="{97E08C18-C4B8-4ADF-80F6-3405C893E2EF}" type="pres">
-      <dgm:prSet presAssocID="{0F8B1829-5C53-4B41-9E98-E1669609B844}" presName="childText" presStyleLbl="conFgAcc1" presStyleIdx="1" presStyleCnt="3">
+    <dgm:pt modelId="{83C7E223-8604-411D-850F-9896621A0F2F}" type="pres">
+      <dgm:prSet presAssocID="{B1E6CD13-531E-4BDF-B9E5-E32CB9CC3258}" presName="childText" presStyleLbl="conFgAcc1" presStyleIdx="1" presStyleCnt="5">
         <dgm:presLayoutVars>
           <dgm:bulletEnabled val="1"/>
         </dgm:presLayoutVars>
       </dgm:prSet>
       <dgm:spPr/>
+      <dgm:t>
+        <a:bodyPr/>
+        <a:lstStyle/>
+        <a:p>
+          <a:endParaRPr lang="en-US"/>
+        </a:p>
+      </dgm:t>
     </dgm:pt>
-    <dgm:pt modelId="{35FC3F06-4B99-4EB0-B685-1955C2AD229E}" type="pres">
-      <dgm:prSet presAssocID="{AA61016F-FA5F-490E-A274-365467364A3E}" presName="spaceBetweenRectangles" presStyleCnt="0"/>
+    <dgm:pt modelId="{E171E4F6-50B4-427B-8D75-CA6ACB26FC62}" type="pres">
+      <dgm:prSet presAssocID="{AAD09A79-83F3-4EB2-AAA2-3CC3051C49CD}" presName="spaceBetweenRectangles" presStyleCnt="0"/>
       <dgm:spPr/>
     </dgm:pt>
-    <dgm:pt modelId="{D398EF6B-2B06-43E0-9C45-B2DBB8640227}" type="pres">
-      <dgm:prSet presAssocID="{D519245D-39A6-4165-82D6-20F5DA8396AA}" presName="parentLin" presStyleCnt="0"/>
+    <dgm:pt modelId="{10B2C37F-426F-49FE-80E5-E9EAC1026A9D}" type="pres">
+      <dgm:prSet presAssocID="{CCD6F4D9-E580-44CE-B9EC-B85FAB15514D}" presName="parentLin" presStyleCnt="0"/>
       <dgm:spPr/>
     </dgm:pt>
-    <dgm:pt modelId="{F416E08C-752F-4D92-AD37-2F4C71FA4075}" type="pres">
-      <dgm:prSet presAssocID="{D519245D-39A6-4165-82D6-20F5DA8396AA}" presName="parentLeftMargin" presStyleLbl="node1" presStyleIdx="1" presStyleCnt="3"/>
+    <dgm:pt modelId="{6FCC2C02-F1B0-47B8-81C0-1D3867CFDB7E}" type="pres">
+      <dgm:prSet presAssocID="{CCD6F4D9-E580-44CE-B9EC-B85FAB15514D}" presName="parentLeftMargin" presStyleLbl="node1" presStyleIdx="1" presStyleCnt="5"/>
       <dgm:spPr/>
+      <dgm:t>
+        <a:bodyPr/>
+        <a:lstStyle/>
+        <a:p>
+          <a:endParaRPr lang="en-US"/>
+        </a:p>
+      </dgm:t>
     </dgm:pt>
-    <dgm:pt modelId="{EBD7D697-3674-426C-A8D3-2E8F0E9669A1}" type="pres">
-      <dgm:prSet presAssocID="{D519245D-39A6-4165-82D6-20F5DA8396AA}" presName="parentText" presStyleLbl="node1" presStyleIdx="2" presStyleCnt="3">
+    <dgm:pt modelId="{BFC5CB00-4EAD-440C-B68A-FD1E0A63E1E7}" type="pres">
+      <dgm:prSet presAssocID="{CCD6F4D9-E580-44CE-B9EC-B85FAB15514D}" presName="parentText" presStyleLbl="node1" presStyleIdx="2" presStyleCnt="5" custScaleX="97349" custLinFactNeighborX="23711" custLinFactNeighborY="-2439">
         <dgm:presLayoutVars>
           <dgm:chMax val="0"/>
           <dgm:bulletEnabled val="1"/>
         </dgm:presLayoutVars>
       </dgm:prSet>
       <dgm:spPr/>
+      <dgm:t>
+        <a:bodyPr/>
+        <a:lstStyle/>
+        <a:p>
+          <a:endParaRPr lang="en-US"/>
+        </a:p>
+      </dgm:t>
     </dgm:pt>
-    <dgm:pt modelId="{641FF595-0738-406F-A1DA-A53FD6AFB8EE}" type="pres">
-      <dgm:prSet presAssocID="{D519245D-39A6-4165-82D6-20F5DA8396AA}" presName="negativeSpace" presStyleCnt="0"/>
+    <dgm:pt modelId="{15022403-9FFF-4920-BAE0-6027B6C4D0CE}" type="pres">
+      <dgm:prSet presAssocID="{CCD6F4D9-E580-44CE-B9EC-B85FAB15514D}" presName="negativeSpace" presStyleCnt="0"/>
       <dgm:spPr/>
     </dgm:pt>
-    <dgm:pt modelId="{E1A35D26-FE76-4034-A3BB-EDBFAE5491D3}" type="pres">
-      <dgm:prSet presAssocID="{D519245D-39A6-4165-82D6-20F5DA8396AA}" presName="childText" presStyleLbl="conFgAcc1" presStyleIdx="2" presStyleCnt="3">
+    <dgm:pt modelId="{E02ECDBA-6982-45A0-87B9-6E788424EB4C}" type="pres">
+      <dgm:prSet presAssocID="{CCD6F4D9-E580-44CE-B9EC-B85FAB15514D}" presName="childText" presStyleLbl="conFgAcc1" presStyleIdx="2" presStyleCnt="5">
         <dgm:presLayoutVars>
           <dgm:bulletEnabled val="1"/>
         </dgm:presLayoutVars>
       </dgm:prSet>
       <dgm:spPr/>
+      <dgm:t>
+        <a:bodyPr/>
+        <a:lstStyle/>
+        <a:p>
+          <a:endParaRPr lang="en-US"/>
+        </a:p>
+      </dgm:t>
+    </dgm:pt>
+    <dgm:pt modelId="{19DDB678-04C1-4A85-81D3-D640D54536E3}" type="pres">
+      <dgm:prSet presAssocID="{B9986600-715A-4FE9-A774-CA5E44E9E476}" presName="spaceBetweenRectangles" presStyleCnt="0"/>
+      <dgm:spPr/>
+    </dgm:pt>
+    <dgm:pt modelId="{2EE9DB0C-EFA3-40B3-A186-C99E3E25BF9A}" type="pres">
+      <dgm:prSet presAssocID="{A79B687B-16F5-470E-B1E1-DDBBBC759246}" presName="parentLin" presStyleCnt="0"/>
+      <dgm:spPr/>
+    </dgm:pt>
+    <dgm:pt modelId="{2BA40631-E19F-43BB-B75E-FE9FD3DEC963}" type="pres">
+      <dgm:prSet presAssocID="{A79B687B-16F5-470E-B1E1-DDBBBC759246}" presName="parentLeftMargin" presStyleLbl="node1" presStyleIdx="2" presStyleCnt="5"/>
+      <dgm:spPr/>
+      <dgm:t>
+        <a:bodyPr/>
+        <a:lstStyle/>
+        <a:p>
+          <a:endParaRPr lang="en-US"/>
+        </a:p>
+      </dgm:t>
+    </dgm:pt>
+    <dgm:pt modelId="{FCCB04ED-DEAF-4E79-BABB-FD4A6BF7C968}" type="pres">
+      <dgm:prSet presAssocID="{A79B687B-16F5-470E-B1E1-DDBBBC759246}" presName="parentText" presStyleLbl="node1" presStyleIdx="3" presStyleCnt="5" custScaleX="95595" custLinFactX="20346" custLinFactNeighborX="100000" custLinFactNeighborY="7808">
+        <dgm:presLayoutVars>
+          <dgm:chMax val="0"/>
+          <dgm:bulletEnabled val="1"/>
+        </dgm:presLayoutVars>
+      </dgm:prSet>
+      <dgm:spPr/>
+      <dgm:t>
+        <a:bodyPr/>
+        <a:lstStyle/>
+        <a:p>
+          <a:endParaRPr lang="en-US"/>
+        </a:p>
+      </dgm:t>
+    </dgm:pt>
+    <dgm:pt modelId="{42869384-69AB-4B59-B3C7-2253B6D88C3B}" type="pres">
+      <dgm:prSet presAssocID="{A79B687B-16F5-470E-B1E1-DDBBBC759246}" presName="negativeSpace" presStyleCnt="0"/>
+      <dgm:spPr/>
+    </dgm:pt>
+    <dgm:pt modelId="{792B327A-87F9-4C15-8E9E-43F0FAEA00FB}" type="pres">
+      <dgm:prSet presAssocID="{A79B687B-16F5-470E-B1E1-DDBBBC759246}" presName="childText" presStyleLbl="conFgAcc1" presStyleIdx="3" presStyleCnt="5">
+        <dgm:presLayoutVars>
+          <dgm:bulletEnabled val="1"/>
+        </dgm:presLayoutVars>
+      </dgm:prSet>
+      <dgm:spPr/>
+      <dgm:t>
+        <a:bodyPr/>
+        <a:lstStyle/>
+        <a:p>
+          <a:endParaRPr lang="en-US"/>
+        </a:p>
+      </dgm:t>
+    </dgm:pt>
+    <dgm:pt modelId="{39773E99-AADF-4D3C-AFD8-AF6C53CA6B93}" type="pres">
+      <dgm:prSet presAssocID="{12F2915A-89C9-40ED-9C3D-D3858DAD886B}" presName="spaceBetweenRectangles" presStyleCnt="0"/>
+      <dgm:spPr/>
+    </dgm:pt>
+    <dgm:pt modelId="{00480373-E4FA-4B0A-84BE-6B5886B220CB}" type="pres">
+      <dgm:prSet presAssocID="{CC0BFA8C-A841-4500-B8D7-201A1A7376D8}" presName="parentLin" presStyleCnt="0"/>
+      <dgm:spPr/>
+    </dgm:pt>
+    <dgm:pt modelId="{D598E3DC-6EC7-472E-B182-351020995CD2}" type="pres">
+      <dgm:prSet presAssocID="{CC0BFA8C-A841-4500-B8D7-201A1A7376D8}" presName="parentLeftMargin" presStyleLbl="node1" presStyleIdx="3" presStyleCnt="5"/>
+      <dgm:spPr/>
+      <dgm:t>
+        <a:bodyPr/>
+        <a:lstStyle/>
+        <a:p>
+          <a:endParaRPr lang="en-US"/>
+        </a:p>
+      </dgm:t>
+    </dgm:pt>
+    <dgm:pt modelId="{679ECB79-E4C8-45C1-BCF5-7A96F922AE3A}" type="pres">
+      <dgm:prSet presAssocID="{CC0BFA8C-A841-4500-B8D7-201A1A7376D8}" presName="parentText" presStyleLbl="node1" presStyleIdx="4" presStyleCnt="5" custLinFactX="21789" custLinFactNeighborX="100000" custLinFactNeighborY="-11636">
+        <dgm:presLayoutVars>
+          <dgm:chMax val="0"/>
+          <dgm:bulletEnabled val="1"/>
+        </dgm:presLayoutVars>
+      </dgm:prSet>
+      <dgm:spPr/>
+      <dgm:t>
+        <a:bodyPr/>
+        <a:lstStyle/>
+        <a:p>
+          <a:endParaRPr lang="en-US"/>
+        </a:p>
+      </dgm:t>
+    </dgm:pt>
+    <dgm:pt modelId="{2F00D0E8-2DB1-4336-AC99-C910334F6F36}" type="pres">
+      <dgm:prSet presAssocID="{CC0BFA8C-A841-4500-B8D7-201A1A7376D8}" presName="negativeSpace" presStyleCnt="0"/>
+      <dgm:spPr/>
+    </dgm:pt>
+    <dgm:pt modelId="{F91EA70D-CE80-424A-A2E9-DA4113EF35A4}" type="pres">
+      <dgm:prSet presAssocID="{CC0BFA8C-A841-4500-B8D7-201A1A7376D8}" presName="childText" presStyleLbl="conFgAcc1" presStyleIdx="4" presStyleCnt="5" custLinFactNeighborX="-5263" custLinFactNeighborY="31786">
+        <dgm:presLayoutVars>
+          <dgm:bulletEnabled val="1"/>
+        </dgm:presLayoutVars>
+      </dgm:prSet>
+      <dgm:spPr/>
+      <dgm:t>
+        <a:bodyPr/>
+        <a:lstStyle/>
+        <a:p>
+          <a:endParaRPr lang="en-US"/>
+        </a:p>
+      </dgm:t>
     </dgm:pt>
   </dgm:ptLst>
   <dgm:cxnLst>
+    <dgm:cxn modelId="{4D3361DA-E4FB-4327-A802-51B1C1EFCEBD}" type="presOf" srcId="{CCD6F4D9-E580-44CE-B9EC-B85FAB15514D}" destId="{6FCC2C02-F1B0-47B8-81C0-1D3867CFDB7E}" srcOrd="0" destOrd="0" presId="urn:microsoft.com/office/officeart/2005/8/layout/list1"/>
+    <dgm:cxn modelId="{6F597E05-684D-41E6-95CA-85232436F586}" type="presOf" srcId="{CC0BFA8C-A841-4500-B8D7-201A1A7376D8}" destId="{679ECB79-E4C8-45C1-BCF5-7A96F922AE3A}" srcOrd="1" destOrd="0" presId="urn:microsoft.com/office/officeart/2005/8/layout/list1"/>
+    <dgm:cxn modelId="{B228BB74-6E8B-43DC-B163-77AA91E4DB89}" type="presOf" srcId="{A79B687B-16F5-470E-B1E1-DDBBBC759246}" destId="{2BA40631-E19F-43BB-B75E-FE9FD3DEC963}" srcOrd="0" destOrd="0" presId="urn:microsoft.com/office/officeart/2005/8/layout/list1"/>
+    <dgm:cxn modelId="{B2B3A8EE-C124-45B3-8BF6-F9265280DB47}" type="presOf" srcId="{EEA9A094-4BCC-4FBF-A54D-FFD01ECE375F}" destId="{CD3AD136-FE6A-45E9-A8EF-EB1FB07FA1B0}" srcOrd="0" destOrd="0" presId="urn:microsoft.com/office/officeart/2005/8/layout/list1"/>
+    <dgm:cxn modelId="{390C6916-F60C-41EE-9586-6DB0C647DE84}" srcId="{A79B687B-16F5-470E-B1E1-DDBBBC759246}" destId="{06292A25-5896-4266-B197-81F09BCCA07F}" srcOrd="1" destOrd="0" parTransId="{60C3E475-02BE-441C-8E05-B041E32248B5}" sibTransId="{CF8A5CD1-0E24-4130-B4C2-0D32F0BC82A5}"/>
+    <dgm:cxn modelId="{73B31DD0-16B6-4947-B5A1-A864F8BEF700}" type="presOf" srcId="{A79B687B-16F5-470E-B1E1-DDBBBC759246}" destId="{FCCB04ED-DEAF-4E79-BABB-FD4A6BF7C968}" srcOrd="1" destOrd="0" presId="urn:microsoft.com/office/officeart/2005/8/layout/list1"/>
+    <dgm:cxn modelId="{A62F5636-8873-4A00-B2A5-B4F17579FE36}" srcId="{08AFD4C6-C41E-4BB6-818F-0A4CBD81EBA5}" destId="{A79B687B-16F5-470E-B1E1-DDBBBC759246}" srcOrd="3" destOrd="0" parTransId="{8F5F3ABD-0363-4FC6-8CEF-FA1CEC06B118}" sibTransId="{12F2915A-89C9-40ED-9C3D-D3858DAD886B}"/>
+    <dgm:cxn modelId="{A4FB456E-DD9B-4B48-BF71-057E54B8C07E}" srcId="{08AFD4C6-C41E-4BB6-818F-0A4CBD81EBA5}" destId="{CC0BFA8C-A841-4500-B8D7-201A1A7376D8}" srcOrd="4" destOrd="0" parTransId="{59D9C842-8016-4103-A7B1-59F66A41FAE7}" sibTransId="{2EF7ADB2-E6A7-4FEA-975B-443D056C2361}"/>
+    <dgm:cxn modelId="{1B031D79-ABD3-4F9A-AABD-60B78765C60B}" type="presOf" srcId="{8F322683-765E-42B1-A75C-81444315BF76}" destId="{792B327A-87F9-4C15-8E9E-43F0FAEA00FB}" srcOrd="0" destOrd="0" presId="urn:microsoft.com/office/officeart/2005/8/layout/list1"/>
+    <dgm:cxn modelId="{75C5A216-1F17-44D0-B2B5-70A9681952FD}" srcId="{CC0BFA8C-A841-4500-B8D7-201A1A7376D8}" destId="{C116615E-76FC-47A8-8F14-9A3FA8207BA6}" srcOrd="1" destOrd="0" parTransId="{541796EF-49FC-4E4D-8342-8A6E52FD79CB}" sibTransId="{8F61520D-9E1F-4ACC-A66E-96FFA9882257}"/>
+    <dgm:cxn modelId="{8EEF90AB-47D2-4D62-9D48-C32A325EACA1}" srcId="{CC0BFA8C-A841-4500-B8D7-201A1A7376D8}" destId="{0B0E9FB8-1BAF-46CE-A5CB-78118DB90488}" srcOrd="0" destOrd="0" parTransId="{77B75B0C-4A9E-405B-9DF8-930836986EE0}" sibTransId="{C6DA572D-8BFD-47E6-BD72-C29630668D8B}"/>
+    <dgm:cxn modelId="{9DBF734C-0F27-4445-A579-3B24D4D46CF3}" type="presOf" srcId="{B1E6CD13-531E-4BDF-B9E5-E32CB9CC3258}" destId="{00413630-CD6F-4285-B5A4-275B8238A3C6}" srcOrd="1" destOrd="0" presId="urn:microsoft.com/office/officeart/2005/8/layout/list1"/>
+    <dgm:cxn modelId="{8CE69F79-A1DC-4E9C-BF37-D14D043E949C}" type="presOf" srcId="{06292A25-5896-4266-B197-81F09BCCA07F}" destId="{792B327A-87F9-4C15-8E9E-43F0FAEA00FB}" srcOrd="0" destOrd="1" presId="urn:microsoft.com/office/officeart/2005/8/layout/list1"/>
+    <dgm:cxn modelId="{46A8BE55-ACB9-44F9-BF54-0060DB78B0DC}" srcId="{08AFD4C6-C41E-4BB6-818F-0A4CBD81EBA5}" destId="{CCD6F4D9-E580-44CE-B9EC-B85FAB15514D}" srcOrd="2" destOrd="0" parTransId="{BF5F8383-3A23-41F1-856F-2AAE6E3EB5E9}" sibTransId="{B9986600-715A-4FE9-A774-CA5E44E9E476}"/>
+    <dgm:cxn modelId="{0BEE089C-FC7A-46A5-9D16-67075163C08A}" type="presOf" srcId="{03F5AD9C-8F8A-4E16-80BF-E2CF70BA5975}" destId="{83C7E223-8604-411D-850F-9896621A0F2F}" srcOrd="0" destOrd="0" presId="urn:microsoft.com/office/officeart/2005/8/layout/list1"/>
+    <dgm:cxn modelId="{1E6BF4D0-0060-4FFE-B8C6-2047617D48F3}" type="presOf" srcId="{CCD6F4D9-E580-44CE-B9EC-B85FAB15514D}" destId="{BFC5CB00-4EAD-440C-B68A-FD1E0A63E1E7}" srcOrd="1" destOrd="0" presId="urn:microsoft.com/office/officeart/2005/8/layout/list1"/>
+    <dgm:cxn modelId="{F6D36691-9D72-40E4-A5E2-746F8EF275B8}" type="presOf" srcId="{C116615E-76FC-47A8-8F14-9A3FA8207BA6}" destId="{F91EA70D-CE80-424A-A2E9-DA4113EF35A4}" srcOrd="0" destOrd="1" presId="urn:microsoft.com/office/officeart/2005/8/layout/list1"/>
+    <dgm:cxn modelId="{788086F2-BF7B-4FD7-82D3-D95C82BEFFF4}" srcId="{EEA9A094-4BCC-4FBF-A54D-FFD01ECE375F}" destId="{FC6E38C2-630D-4072-BAC8-3EAAF35965C2}" srcOrd="1" destOrd="0" parTransId="{33DD31CC-2747-44DD-A73E-EFFA98E07034}" sibTransId="{7D67218A-657E-4C7C-BF21-E9E924EB1097}"/>
+    <dgm:cxn modelId="{FEAAAD9C-7FA8-4249-8D90-164BB35F1A40}" srcId="{EEA9A094-4BCC-4FBF-A54D-FFD01ECE375F}" destId="{91A28DF5-1C26-419C-8784-7E7B4F9BA472}" srcOrd="0" destOrd="0" parTransId="{7B31307C-B2A4-4971-BBEB-BFC4823C2B32}" sibTransId="{BE714A8F-10D8-488B-AEB5-09F91BC0AD6C}"/>
+    <dgm:cxn modelId="{98D971E4-4A4E-400B-93A4-027314A4D2FE}" srcId="{08AFD4C6-C41E-4BB6-818F-0A4CBD81EBA5}" destId="{B1E6CD13-531E-4BDF-B9E5-E32CB9CC3258}" srcOrd="1" destOrd="0" parTransId="{941474AB-D886-425E-98A8-D34211947215}" sibTransId="{AAD09A79-83F3-4EB2-AAA2-3CC3051C49CD}"/>
+    <dgm:cxn modelId="{9164DFB0-A2CE-4F2E-8E11-79AB81BEEE9B}" srcId="{EEA9A094-4BCC-4FBF-A54D-FFD01ECE375F}" destId="{432F55CD-36FD-4AEE-96AA-D68DA8DE786D}" srcOrd="2" destOrd="0" parTransId="{4756E7C2-6CDC-45D2-A477-B22D93AA8788}" sibTransId="{A2C8CBB2-D525-4393-8211-4E3400CADD65}"/>
+    <dgm:cxn modelId="{E7F88F65-7DCD-48EC-8F7A-FA40D9A0CF02}" srcId="{08AFD4C6-C41E-4BB6-818F-0A4CBD81EBA5}" destId="{EEA9A094-4BCC-4FBF-A54D-FFD01ECE375F}" srcOrd="0" destOrd="0" parTransId="{16860955-36AE-471A-A212-45BB9F2B11EE}" sibTransId="{EB1D4B32-2FCD-41C2-B6D7-1E3687B33873}"/>
+    <dgm:cxn modelId="{103175FB-6E75-49FA-95F5-305C9594ED1D}" srcId="{B1E6CD13-531E-4BDF-B9E5-E32CB9CC3258}" destId="{03F5AD9C-8F8A-4E16-80BF-E2CF70BA5975}" srcOrd="0" destOrd="0" parTransId="{0E99BDD7-8DA1-41AD-9F18-A022A3F6901C}" sibTransId="{20338D45-8836-49BF-A5A6-C5FD20E83EB9}"/>
+    <dgm:cxn modelId="{99D99F68-971D-4A37-956C-67F0B6495BF8}" type="presOf" srcId="{1BB80CA9-DA5D-4BFB-ABA8-D9520179DED6}" destId="{E02ECDBA-6982-45A0-87B9-6E788424EB4C}" srcOrd="0" destOrd="0" presId="urn:microsoft.com/office/officeart/2005/8/layout/list1"/>
+    <dgm:cxn modelId="{BB95E185-790B-40E2-80F8-8B13CBF18E7B}" type="presOf" srcId="{EEA9A094-4BCC-4FBF-A54D-FFD01ECE375F}" destId="{6C8870DD-F868-4EFE-974A-688CD09E4B30}" srcOrd="1" destOrd="0" presId="urn:microsoft.com/office/officeart/2005/8/layout/list1"/>
+    <dgm:cxn modelId="{A0EBA1AD-BE9A-4F55-925A-8DE621D3979A}" srcId="{CCD6F4D9-E580-44CE-B9EC-B85FAB15514D}" destId="{1BB80CA9-DA5D-4BFB-ABA8-D9520179DED6}" srcOrd="0" destOrd="0" parTransId="{F76A7D89-7813-4ABF-9B6F-D527612490C3}" sibTransId="{16E2B7EC-8443-45FA-A4CF-0F51B0591AED}"/>
     <dgm:cxn modelId="{5F738DA9-AF1C-4E0B-9737-CC422B05534E}" type="presOf" srcId="{08AFD4C6-C41E-4BB6-818F-0A4CBD81EBA5}" destId="{E9272DBB-2D6C-4A90-9286-392A95F3A2BD}" srcOrd="0" destOrd="0" presId="urn:microsoft.com/office/officeart/2005/8/layout/list1"/>
-    <dgm:cxn modelId="{1B95A1F2-5E09-4B80-AC9F-743B070BFD2D}" type="presOf" srcId="{1B005DB3-472B-448A-A805-4599A19C9C07}" destId="{30E9498D-298F-450B-858D-4C317E14DB24}" srcOrd="0" destOrd="0" presId="urn:microsoft.com/office/officeart/2005/8/layout/list1"/>
-    <dgm:cxn modelId="{94FF39BA-5FFE-4D32-ABF2-682A19D6FB53}" srcId="{08AFD4C6-C41E-4BB6-818F-0A4CBD81EBA5}" destId="{1B005DB3-472B-448A-A805-4599A19C9C07}" srcOrd="0" destOrd="0" parTransId="{F4A230F2-CD59-466D-B1EC-541C1566173E}" sibTransId="{C4D2CACD-38DB-4B7E-92F1-CDD2B8F74E56}"/>
-    <dgm:cxn modelId="{E43183C2-0BC6-4567-8D16-1C791778F61A}" srcId="{08AFD4C6-C41E-4BB6-818F-0A4CBD81EBA5}" destId="{D519245D-39A6-4165-82D6-20F5DA8396AA}" srcOrd="2" destOrd="0" parTransId="{4702B203-45CE-4B12-89B4-48560F26287E}" sibTransId="{A57CD843-16C1-425E-95E9-9DA954EB8AE0}"/>
-    <dgm:cxn modelId="{4F7F1119-F99E-4907-8A25-8DF934CF8AA4}" type="presOf" srcId="{D519245D-39A6-4165-82D6-20F5DA8396AA}" destId="{EBD7D697-3674-426C-A8D3-2E8F0E9669A1}" srcOrd="1" destOrd="0" presId="urn:microsoft.com/office/officeart/2005/8/layout/list1"/>
-    <dgm:cxn modelId="{2486AE54-CE02-45CC-8382-FA1E83E3B0A2}" type="presOf" srcId="{D519245D-39A6-4165-82D6-20F5DA8396AA}" destId="{F416E08C-752F-4D92-AD37-2F4C71FA4075}" srcOrd="0" destOrd="0" presId="urn:microsoft.com/office/officeart/2005/8/layout/list1"/>
-    <dgm:cxn modelId="{846A0BE7-96B5-41B0-9248-0996DBFA96B9}" type="presOf" srcId="{0F8B1829-5C53-4B41-9E98-E1669609B844}" destId="{A5EFF379-9116-479F-81BA-041B9ED680BF}" srcOrd="0" destOrd="0" presId="urn:microsoft.com/office/officeart/2005/8/layout/list1"/>
-    <dgm:cxn modelId="{4C2A0184-3A55-446A-9636-7B2ABAC2B9EA}" type="presOf" srcId="{0F8B1829-5C53-4B41-9E98-E1669609B844}" destId="{C73A8D99-D548-4FBA-90A5-1413658EED22}" srcOrd="1" destOrd="0" presId="urn:microsoft.com/office/officeart/2005/8/layout/list1"/>
-    <dgm:cxn modelId="{5D65D43C-DB04-4481-87F4-9F469B028029}" srcId="{08AFD4C6-C41E-4BB6-818F-0A4CBD81EBA5}" destId="{0F8B1829-5C53-4B41-9E98-E1669609B844}" srcOrd="1" destOrd="0" parTransId="{5E0DB286-3820-4612-A2D1-0AA670561D84}" sibTransId="{AA61016F-FA5F-490E-A274-365467364A3E}"/>
-    <dgm:cxn modelId="{4D9EC3F0-FB7F-4EDB-B164-EAC440B2E4F5}" type="presOf" srcId="{1B005DB3-472B-448A-A805-4599A19C9C07}" destId="{3E994891-3FC7-4508-AA2C-6529F3B7F173}" srcOrd="1" destOrd="0" presId="urn:microsoft.com/office/officeart/2005/8/layout/list1"/>
-    <dgm:cxn modelId="{D9B51EE7-69DA-4C5B-8D8F-35E8E5D25773}" type="presParOf" srcId="{E9272DBB-2D6C-4A90-9286-392A95F3A2BD}" destId="{DFBCA64A-4D89-4308-B223-38355C7B62B8}" srcOrd="0" destOrd="0" presId="urn:microsoft.com/office/officeart/2005/8/layout/list1"/>
-    <dgm:cxn modelId="{BFFAD279-02AA-46BE-AF51-FE999A95FD93}" type="presParOf" srcId="{DFBCA64A-4D89-4308-B223-38355C7B62B8}" destId="{30E9498D-298F-450B-858D-4C317E14DB24}" srcOrd="0" destOrd="0" presId="urn:microsoft.com/office/officeart/2005/8/layout/list1"/>
-    <dgm:cxn modelId="{565BDC52-3C08-44BA-80D8-7CD54FBCCD7B}" type="presParOf" srcId="{DFBCA64A-4D89-4308-B223-38355C7B62B8}" destId="{3E994891-3FC7-4508-AA2C-6529F3B7F173}" srcOrd="1" destOrd="0" presId="urn:microsoft.com/office/officeart/2005/8/layout/list1"/>
-    <dgm:cxn modelId="{2BA88068-1A26-4704-8153-893EA246CE92}" type="presParOf" srcId="{E9272DBB-2D6C-4A90-9286-392A95F3A2BD}" destId="{0AB53A35-9F54-4C1A-BFDC-AB41349D5C21}" srcOrd="1" destOrd="0" presId="urn:microsoft.com/office/officeart/2005/8/layout/list1"/>
-    <dgm:cxn modelId="{1711E2DC-C817-4951-A16B-B8F84B5CD9BA}" type="presParOf" srcId="{E9272DBB-2D6C-4A90-9286-392A95F3A2BD}" destId="{F25EA0A9-B79F-4A26-8FB8-EC72DD6C8279}" srcOrd="2" destOrd="0" presId="urn:microsoft.com/office/officeart/2005/8/layout/list1"/>
-    <dgm:cxn modelId="{8F8E77A3-6485-4F48-819C-F91947CD1FA7}" type="presParOf" srcId="{E9272DBB-2D6C-4A90-9286-392A95F3A2BD}" destId="{5ED15094-D8FB-4D97-BE67-0A75E75EE816}" srcOrd="3" destOrd="0" presId="urn:microsoft.com/office/officeart/2005/8/layout/list1"/>
-    <dgm:cxn modelId="{C6DBF554-1748-4024-9B24-796E8A832026}" type="presParOf" srcId="{E9272DBB-2D6C-4A90-9286-392A95F3A2BD}" destId="{3B15655F-7B93-4034-9E76-FD2B4A677A1F}" srcOrd="4" destOrd="0" presId="urn:microsoft.com/office/officeart/2005/8/layout/list1"/>
-    <dgm:cxn modelId="{9FD240F8-5EE4-4642-89A5-28FE879DE9FD}" type="presParOf" srcId="{3B15655F-7B93-4034-9E76-FD2B4A677A1F}" destId="{A5EFF379-9116-479F-81BA-041B9ED680BF}" srcOrd="0" destOrd="0" presId="urn:microsoft.com/office/officeart/2005/8/layout/list1"/>
-    <dgm:cxn modelId="{16530107-025C-46BE-9150-99D234B07321}" type="presParOf" srcId="{3B15655F-7B93-4034-9E76-FD2B4A677A1F}" destId="{C73A8D99-D548-4FBA-90A5-1413658EED22}" srcOrd="1" destOrd="0" presId="urn:microsoft.com/office/officeart/2005/8/layout/list1"/>
-    <dgm:cxn modelId="{FDE4190F-30C6-4BD5-84E2-5F56992CF024}" type="presParOf" srcId="{E9272DBB-2D6C-4A90-9286-392A95F3A2BD}" destId="{66D626D8-4DE6-40EC-A0D7-3CA5EB467E92}" srcOrd="5" destOrd="0" presId="urn:microsoft.com/office/officeart/2005/8/layout/list1"/>
-    <dgm:cxn modelId="{DFB6FD90-D781-44E3-89DA-A3DDF0E773F6}" type="presParOf" srcId="{E9272DBB-2D6C-4A90-9286-392A95F3A2BD}" destId="{97E08C18-C4B8-4ADF-80F6-3405C893E2EF}" srcOrd="6" destOrd="0" presId="urn:microsoft.com/office/officeart/2005/8/layout/list1"/>
-    <dgm:cxn modelId="{D82CFCE7-5C10-4F7A-B58C-D94C1523DF52}" type="presParOf" srcId="{E9272DBB-2D6C-4A90-9286-392A95F3A2BD}" destId="{35FC3F06-4B99-4EB0-B685-1955C2AD229E}" srcOrd="7" destOrd="0" presId="urn:microsoft.com/office/officeart/2005/8/layout/list1"/>
-    <dgm:cxn modelId="{9229DC35-FB8A-47E4-B87E-676E7620BE7C}" type="presParOf" srcId="{E9272DBB-2D6C-4A90-9286-392A95F3A2BD}" destId="{D398EF6B-2B06-43E0-9C45-B2DBB8640227}" srcOrd="8" destOrd="0" presId="urn:microsoft.com/office/officeart/2005/8/layout/list1"/>
-    <dgm:cxn modelId="{D55A827D-802A-4B3D-AF11-6A955266A94A}" type="presParOf" srcId="{D398EF6B-2B06-43E0-9C45-B2DBB8640227}" destId="{F416E08C-752F-4D92-AD37-2F4C71FA4075}" srcOrd="0" destOrd="0" presId="urn:microsoft.com/office/officeart/2005/8/layout/list1"/>
-    <dgm:cxn modelId="{9A835885-F81E-4331-94AB-B0F95AB539C9}" type="presParOf" srcId="{D398EF6B-2B06-43E0-9C45-B2DBB8640227}" destId="{EBD7D697-3674-426C-A8D3-2E8F0E9669A1}" srcOrd="1" destOrd="0" presId="urn:microsoft.com/office/officeart/2005/8/layout/list1"/>
-    <dgm:cxn modelId="{B9577FA9-3F15-4BFB-99F4-F44CD0C094C9}" type="presParOf" srcId="{E9272DBB-2D6C-4A90-9286-392A95F3A2BD}" destId="{641FF595-0738-406F-A1DA-A53FD6AFB8EE}" srcOrd="9" destOrd="0" presId="urn:microsoft.com/office/officeart/2005/8/layout/list1"/>
-    <dgm:cxn modelId="{CC1EB50D-9B18-4CA5-8D12-29A2D62ED233}" type="presParOf" srcId="{E9272DBB-2D6C-4A90-9286-392A95F3A2BD}" destId="{E1A35D26-FE76-4034-A3BB-EDBFAE5491D3}" srcOrd="10" destOrd="0" presId="urn:microsoft.com/office/officeart/2005/8/layout/list1"/>
+    <dgm:cxn modelId="{203A3346-2D7E-4944-B996-40EF677A3A25}" type="presOf" srcId="{CC0BFA8C-A841-4500-B8D7-201A1A7376D8}" destId="{D598E3DC-6EC7-472E-B182-351020995CD2}" srcOrd="0" destOrd="0" presId="urn:microsoft.com/office/officeart/2005/8/layout/list1"/>
+    <dgm:cxn modelId="{A50C44D0-3AFD-44CF-9BDC-E6DBFF4BBDC9}" type="presOf" srcId="{FC6E38C2-630D-4072-BAC8-3EAAF35965C2}" destId="{F4F3316C-7C9E-477A-95CC-6FAD826AC78D}" srcOrd="0" destOrd="1" presId="urn:microsoft.com/office/officeart/2005/8/layout/list1"/>
+    <dgm:cxn modelId="{B8F34F1D-E6E3-4A36-92A9-B3CEF2711337}" type="presOf" srcId="{0B0E9FB8-1BAF-46CE-A5CB-78118DB90488}" destId="{F91EA70D-CE80-424A-A2E9-DA4113EF35A4}" srcOrd="0" destOrd="0" presId="urn:microsoft.com/office/officeart/2005/8/layout/list1"/>
+    <dgm:cxn modelId="{C350D824-2C13-4E3A-997A-1A523B9511A8}" srcId="{A79B687B-16F5-470E-B1E1-DDBBBC759246}" destId="{8F322683-765E-42B1-A75C-81444315BF76}" srcOrd="0" destOrd="0" parTransId="{0B575106-E1FA-4406-BDC4-5EFECD2D2599}" sibTransId="{79213D30-29A6-4ACB-AE30-7A15FE1C420B}"/>
+    <dgm:cxn modelId="{A8B88E9B-FE77-46F9-AFFE-54162494524E}" type="presOf" srcId="{91A28DF5-1C26-419C-8784-7E7B4F9BA472}" destId="{F4F3316C-7C9E-477A-95CC-6FAD826AC78D}" srcOrd="0" destOrd="0" presId="urn:microsoft.com/office/officeart/2005/8/layout/list1"/>
+    <dgm:cxn modelId="{85B72F8D-468D-4C26-98E7-3AC0168CA69C}" type="presOf" srcId="{B1E6CD13-531E-4BDF-B9E5-E32CB9CC3258}" destId="{5E486EC8-A0F0-401E-97A1-772E5AF10D9A}" srcOrd="0" destOrd="0" presId="urn:microsoft.com/office/officeart/2005/8/layout/list1"/>
+    <dgm:cxn modelId="{512EE0B6-2756-45ED-9F82-6D8FAB11105C}" type="presOf" srcId="{432F55CD-36FD-4AEE-96AA-D68DA8DE786D}" destId="{F4F3316C-7C9E-477A-95CC-6FAD826AC78D}" srcOrd="0" destOrd="2" presId="urn:microsoft.com/office/officeart/2005/8/layout/list1"/>
+    <dgm:cxn modelId="{D9809839-7660-43BF-B28F-444C0829B1C7}" type="presParOf" srcId="{E9272DBB-2D6C-4A90-9286-392A95F3A2BD}" destId="{677FD4AD-08F3-47C0-B43D-83F7FA09DED9}" srcOrd="0" destOrd="0" presId="urn:microsoft.com/office/officeart/2005/8/layout/list1"/>
+    <dgm:cxn modelId="{70CF85DE-0674-483F-BA51-8B8825B22FED}" type="presParOf" srcId="{677FD4AD-08F3-47C0-B43D-83F7FA09DED9}" destId="{CD3AD136-FE6A-45E9-A8EF-EB1FB07FA1B0}" srcOrd="0" destOrd="0" presId="urn:microsoft.com/office/officeart/2005/8/layout/list1"/>
+    <dgm:cxn modelId="{FADFDA4D-5539-4E2E-846B-CB8A10EDEDFE}" type="presParOf" srcId="{677FD4AD-08F3-47C0-B43D-83F7FA09DED9}" destId="{6C8870DD-F868-4EFE-974A-688CD09E4B30}" srcOrd="1" destOrd="0" presId="urn:microsoft.com/office/officeart/2005/8/layout/list1"/>
+    <dgm:cxn modelId="{0E9FC4B7-B7F4-446A-A09E-E76A68ABF211}" type="presParOf" srcId="{E9272DBB-2D6C-4A90-9286-392A95F3A2BD}" destId="{5FEBAA16-1883-4761-927B-F038586C5999}" srcOrd="1" destOrd="0" presId="urn:microsoft.com/office/officeart/2005/8/layout/list1"/>
+    <dgm:cxn modelId="{E361AC9B-ABF7-4E10-B7AE-40E8649C5F75}" type="presParOf" srcId="{E9272DBB-2D6C-4A90-9286-392A95F3A2BD}" destId="{F4F3316C-7C9E-477A-95CC-6FAD826AC78D}" srcOrd="2" destOrd="0" presId="urn:microsoft.com/office/officeart/2005/8/layout/list1"/>
+    <dgm:cxn modelId="{0F1D4829-81DA-4A71-A7B8-3706A02C83F4}" type="presParOf" srcId="{E9272DBB-2D6C-4A90-9286-392A95F3A2BD}" destId="{4E058239-01D3-4FB7-B140-9866AEABDE89}" srcOrd="3" destOrd="0" presId="urn:microsoft.com/office/officeart/2005/8/layout/list1"/>
+    <dgm:cxn modelId="{61E60AAD-A3E2-4A35-9040-9189BA4FAB1E}" type="presParOf" srcId="{E9272DBB-2D6C-4A90-9286-392A95F3A2BD}" destId="{7B0C6284-33F9-43F4-B7E4-38E92E241623}" srcOrd="4" destOrd="0" presId="urn:microsoft.com/office/officeart/2005/8/layout/list1"/>
+    <dgm:cxn modelId="{63C485E7-1E89-413F-B4B3-74D9CB082D0B}" type="presParOf" srcId="{7B0C6284-33F9-43F4-B7E4-38E92E241623}" destId="{5E486EC8-A0F0-401E-97A1-772E5AF10D9A}" srcOrd="0" destOrd="0" presId="urn:microsoft.com/office/officeart/2005/8/layout/list1"/>
+    <dgm:cxn modelId="{D0164D21-4FA2-4937-8F7C-9903976BAD8E}" type="presParOf" srcId="{7B0C6284-33F9-43F4-B7E4-38E92E241623}" destId="{00413630-CD6F-4285-B5A4-275B8238A3C6}" srcOrd="1" destOrd="0" presId="urn:microsoft.com/office/officeart/2005/8/layout/list1"/>
+    <dgm:cxn modelId="{1DC68797-2E80-4ED6-AD99-1132565943F6}" type="presParOf" srcId="{E9272DBB-2D6C-4A90-9286-392A95F3A2BD}" destId="{C0BFA1ED-C4DC-49DA-98B1-F246F407008F}" srcOrd="5" destOrd="0" presId="urn:microsoft.com/office/officeart/2005/8/layout/list1"/>
+    <dgm:cxn modelId="{0E7A1139-8F59-4858-9AB8-7B8C76A426D3}" type="presParOf" srcId="{E9272DBB-2D6C-4A90-9286-392A95F3A2BD}" destId="{83C7E223-8604-411D-850F-9896621A0F2F}" srcOrd="6" destOrd="0" presId="urn:microsoft.com/office/officeart/2005/8/layout/list1"/>
+    <dgm:cxn modelId="{EC9324FB-0025-4C77-956D-6A129FA25D7D}" type="presParOf" srcId="{E9272DBB-2D6C-4A90-9286-392A95F3A2BD}" destId="{E171E4F6-50B4-427B-8D75-CA6ACB26FC62}" srcOrd="7" destOrd="0" presId="urn:microsoft.com/office/officeart/2005/8/layout/list1"/>
+    <dgm:cxn modelId="{44D77C39-C27B-4DF2-8065-B34A8D4D283C}" type="presParOf" srcId="{E9272DBB-2D6C-4A90-9286-392A95F3A2BD}" destId="{10B2C37F-426F-49FE-80E5-E9EAC1026A9D}" srcOrd="8" destOrd="0" presId="urn:microsoft.com/office/officeart/2005/8/layout/list1"/>
+    <dgm:cxn modelId="{D40FEF49-5156-40F0-92D1-4D4564991B91}" type="presParOf" srcId="{10B2C37F-426F-49FE-80E5-E9EAC1026A9D}" destId="{6FCC2C02-F1B0-47B8-81C0-1D3867CFDB7E}" srcOrd="0" destOrd="0" presId="urn:microsoft.com/office/officeart/2005/8/layout/list1"/>
+    <dgm:cxn modelId="{133CC5BA-35DE-482C-B207-3F7B032FB2A8}" type="presParOf" srcId="{10B2C37F-426F-49FE-80E5-E9EAC1026A9D}" destId="{BFC5CB00-4EAD-440C-B68A-FD1E0A63E1E7}" srcOrd="1" destOrd="0" presId="urn:microsoft.com/office/officeart/2005/8/layout/list1"/>
+    <dgm:cxn modelId="{A55B1352-EA10-4E4B-8F1F-7A062DB8CD86}" type="presParOf" srcId="{E9272DBB-2D6C-4A90-9286-392A95F3A2BD}" destId="{15022403-9FFF-4920-BAE0-6027B6C4D0CE}" srcOrd="9" destOrd="0" presId="urn:microsoft.com/office/officeart/2005/8/layout/list1"/>
+    <dgm:cxn modelId="{1AF98265-BFCD-4014-A43B-EA55251D2624}" type="presParOf" srcId="{E9272DBB-2D6C-4A90-9286-392A95F3A2BD}" destId="{E02ECDBA-6982-45A0-87B9-6E788424EB4C}" srcOrd="10" destOrd="0" presId="urn:microsoft.com/office/officeart/2005/8/layout/list1"/>
+    <dgm:cxn modelId="{AB966C6F-B947-47BD-A33F-23E04CA81051}" type="presParOf" srcId="{E9272DBB-2D6C-4A90-9286-392A95F3A2BD}" destId="{19DDB678-04C1-4A85-81D3-D640D54536E3}" srcOrd="11" destOrd="0" presId="urn:microsoft.com/office/officeart/2005/8/layout/list1"/>
+    <dgm:cxn modelId="{EF5B3752-5DB9-4506-BD1D-CFF624AAE328}" type="presParOf" srcId="{E9272DBB-2D6C-4A90-9286-392A95F3A2BD}" destId="{2EE9DB0C-EFA3-40B3-A186-C99E3E25BF9A}" srcOrd="12" destOrd="0" presId="urn:microsoft.com/office/officeart/2005/8/layout/list1"/>
+    <dgm:cxn modelId="{2C76BA28-F8B8-47D1-B6C9-E6105CA53E77}" type="presParOf" srcId="{2EE9DB0C-EFA3-40B3-A186-C99E3E25BF9A}" destId="{2BA40631-E19F-43BB-B75E-FE9FD3DEC963}" srcOrd="0" destOrd="0" presId="urn:microsoft.com/office/officeart/2005/8/layout/list1"/>
+    <dgm:cxn modelId="{72B4EB27-0F6F-4966-BD6F-9AB2A999CBB1}" type="presParOf" srcId="{2EE9DB0C-EFA3-40B3-A186-C99E3E25BF9A}" destId="{FCCB04ED-DEAF-4E79-BABB-FD4A6BF7C968}" srcOrd="1" destOrd="0" presId="urn:microsoft.com/office/officeart/2005/8/layout/list1"/>
+    <dgm:cxn modelId="{D8B8851C-B4B6-4020-8707-A308B016F4AA}" type="presParOf" srcId="{E9272DBB-2D6C-4A90-9286-392A95F3A2BD}" destId="{42869384-69AB-4B59-B3C7-2253B6D88C3B}" srcOrd="13" destOrd="0" presId="urn:microsoft.com/office/officeart/2005/8/layout/list1"/>
+    <dgm:cxn modelId="{71C6E35D-590B-442B-9BA8-F69892F56D75}" type="presParOf" srcId="{E9272DBB-2D6C-4A90-9286-392A95F3A2BD}" destId="{792B327A-87F9-4C15-8E9E-43F0FAEA00FB}" srcOrd="14" destOrd="0" presId="urn:microsoft.com/office/officeart/2005/8/layout/list1"/>
+    <dgm:cxn modelId="{3D6549AD-811A-46B2-80C8-85B15800C676}" type="presParOf" srcId="{E9272DBB-2D6C-4A90-9286-392A95F3A2BD}" destId="{39773E99-AADF-4D3C-AFD8-AF6C53CA6B93}" srcOrd="15" destOrd="0" presId="urn:microsoft.com/office/officeart/2005/8/layout/list1"/>
+    <dgm:cxn modelId="{EB5C7786-E214-4DF0-BD52-8319ABE61661}" type="presParOf" srcId="{E9272DBB-2D6C-4A90-9286-392A95F3A2BD}" destId="{00480373-E4FA-4B0A-84BE-6B5886B220CB}" srcOrd="16" destOrd="0" presId="urn:microsoft.com/office/officeart/2005/8/layout/list1"/>
+    <dgm:cxn modelId="{9A68CE41-9274-4DC9-8A34-634846C206C2}" type="presParOf" srcId="{00480373-E4FA-4B0A-84BE-6B5886B220CB}" destId="{D598E3DC-6EC7-472E-B182-351020995CD2}" srcOrd="0" destOrd="0" presId="urn:microsoft.com/office/officeart/2005/8/layout/list1"/>
+    <dgm:cxn modelId="{014C2EA7-B87B-48AB-BC15-195E7722135C}" type="presParOf" srcId="{00480373-E4FA-4B0A-84BE-6B5886B220CB}" destId="{679ECB79-E4C8-45C1-BCF5-7A96F922AE3A}" srcOrd="1" destOrd="0" presId="urn:microsoft.com/office/officeart/2005/8/layout/list1"/>
+    <dgm:cxn modelId="{0344483E-5D57-4635-AC4B-FDCC5592EE38}" type="presParOf" srcId="{E9272DBB-2D6C-4A90-9286-392A95F3A2BD}" destId="{2F00D0E8-2DB1-4336-AC99-C910334F6F36}" srcOrd="17" destOrd="0" presId="urn:microsoft.com/office/officeart/2005/8/layout/list1"/>
+    <dgm:cxn modelId="{72D19A62-6888-4C5B-8E17-FE555194239E}" type="presParOf" srcId="{E9272DBB-2D6C-4A90-9286-392A95F3A2BD}" destId="{F91EA70D-CE80-424A-A2E9-DA4113EF35A4}" srcOrd="18" destOrd="0" presId="urn:microsoft.com/office/officeart/2005/8/layout/list1"/>
   </dgm:cxnLst>
   <dgm:bg/>
   <dgm:whole/>
@@ -1128,15 +1764,15 @@
       <dsp:cNvGrpSpPr/>
     </dsp:nvGrpSpPr>
     <dsp:grpSpPr/>
-    <dsp:sp modelId="{F25EA0A9-B79F-4A26-8FB8-EC72DD6C8279}">
+    <dsp:sp modelId="{F4F3316C-7C9E-477A-95CC-6FAD826AC78D}">
       <dsp:nvSpPr>
         <dsp:cNvPr id="0" name=""/>
         <dsp:cNvSpPr/>
       </dsp:nvSpPr>
       <dsp:spPr>
         <a:xfrm>
-          <a:off x="0" y="231899"/>
-          <a:ext cx="6400800" cy="378000"/>
+          <a:off x="0" y="273929"/>
+          <a:ext cx="8686800" cy="1304100"/>
         </a:xfrm>
         <a:prstGeom prst="rect">
           <a:avLst/>
@@ -1175,16 +1811,83 @@
         </a:effectRef>
         <a:fontRef idx="minor"/>
       </dsp:style>
+      <dsp:txBody>
+        <a:bodyPr spcFirstLastPara="0" vert="horz" wrap="square" lIns="674192" tIns="374904" rIns="674192" bIns="128016" numCol="1" spcCol="1270" anchor="t" anchorCtr="0">
+          <a:noAutofit/>
+        </a:bodyPr>
+        <a:lstStyle/>
+        <a:p>
+          <a:pPr marL="171450" lvl="1" indent="-171450" algn="l" defTabSz="800100">
+            <a:lnSpc>
+              <a:spcPct val="90000"/>
+            </a:lnSpc>
+            <a:spcBef>
+              <a:spcPct val="0"/>
+            </a:spcBef>
+            <a:spcAft>
+              <a:spcPct val="15000"/>
+            </a:spcAft>
+            <a:buChar char="••"/>
+          </a:pPr>
+          <a:r>
+            <a:rPr lang="en-US" sz="1800" kern="1200" dirty="0" smtClean="0"/>
+            <a:t>who the stakeholders are and what they want</a:t>
+          </a:r>
+          <a:endParaRPr lang="en-US" sz="1800" kern="1200" dirty="0"/>
+        </a:p>
+        <a:p>
+          <a:pPr marL="171450" lvl="1" indent="-171450" algn="l" defTabSz="800100">
+            <a:lnSpc>
+              <a:spcPct val="90000"/>
+            </a:lnSpc>
+            <a:spcBef>
+              <a:spcPct val="0"/>
+            </a:spcBef>
+            <a:spcAft>
+              <a:spcPct val="15000"/>
+            </a:spcAft>
+            <a:buChar char="••"/>
+          </a:pPr>
+          <a:r>
+            <a:rPr lang="en-US" sz="1800" kern="1200" dirty="0" smtClean="0"/>
+            <a:t>Who the passengers are and what they want</a:t>
+          </a:r>
+          <a:endParaRPr lang="en-US" sz="1800" kern="1200" dirty="0"/>
+        </a:p>
+        <a:p>
+          <a:pPr marL="171450" lvl="1" indent="-171450" algn="l" defTabSz="800100">
+            <a:lnSpc>
+              <a:spcPct val="90000"/>
+            </a:lnSpc>
+            <a:spcBef>
+              <a:spcPct val="0"/>
+            </a:spcBef>
+            <a:spcAft>
+              <a:spcPct val="15000"/>
+            </a:spcAft>
+            <a:buChar char="••"/>
+          </a:pPr>
+          <a:r>
+            <a:rPr lang="en-US" sz="1800" kern="1200" dirty="0" smtClean="0"/>
+            <a:t>How our solution will help them with their problem .</a:t>
+          </a:r>
+          <a:endParaRPr lang="en-US" sz="1800" kern="1200" dirty="0"/>
+        </a:p>
+      </dsp:txBody>
+      <dsp:txXfrm>
+        <a:off x="0" y="273929"/>
+        <a:ext cx="8686800" cy="1304100"/>
+      </dsp:txXfrm>
     </dsp:sp>
-    <dsp:sp modelId="{3E994891-3FC7-4508-AA2C-6529F3B7F173}">
+    <dsp:sp modelId="{6C8870DD-F868-4EFE-974A-688CD09E4B30}">
       <dsp:nvSpPr>
         <dsp:cNvPr id="0" name=""/>
         <dsp:cNvSpPr/>
       </dsp:nvSpPr>
       <dsp:spPr>
         <a:xfrm>
-          <a:off x="320040" y="10499"/>
-          <a:ext cx="4480560" cy="442800"/>
+          <a:off x="447774" y="19052"/>
+          <a:ext cx="6080760" cy="531360"/>
         </a:xfrm>
         <a:prstGeom prst="roundRect">
           <a:avLst/>
@@ -1225,12 +1928,12 @@
         </a:fontRef>
       </dsp:style>
       <dsp:txBody>
-        <a:bodyPr spcFirstLastPara="0" vert="horz" wrap="square" lIns="169355" tIns="0" rIns="169355" bIns="0" numCol="1" spcCol="1270" anchor="ctr" anchorCtr="0">
+        <a:bodyPr spcFirstLastPara="0" vert="horz" wrap="square" lIns="229838" tIns="0" rIns="229838" bIns="0" numCol="1" spcCol="1270" anchor="ctr" anchorCtr="0">
           <a:noAutofit/>
         </a:bodyPr>
         <a:lstStyle/>
         <a:p>
-          <a:pPr lvl="0" algn="l" defTabSz="666750">
+          <a:pPr lvl="0" algn="l" defTabSz="800100">
             <a:lnSpc>
               <a:spcPct val="90000"/>
             </a:lnSpc>
@@ -1242,26 +1945,26 @@
             </a:spcAft>
           </a:pPr>
           <a:r>
-            <a:rPr lang="en-US" sz="1500" kern="1200" dirty="0" smtClean="0"/>
-            <a:t>test</a:t>
+            <a:rPr lang="en-US" sz="1800" kern="1200" dirty="0" smtClean="0"/>
+            <a:t>The vision document  Contains the general ideas of :</a:t>
           </a:r>
-          <a:endParaRPr lang="en-US" sz="1500" kern="1200" dirty="0"/>
+          <a:endParaRPr lang="en-US" sz="1800" kern="1200" dirty="0"/>
         </a:p>
       </dsp:txBody>
       <dsp:txXfrm>
-        <a:off x="320040" y="10499"/>
-        <a:ext cx="4480560" cy="442800"/>
+        <a:off x="447774" y="19052"/>
+        <a:ext cx="6080760" cy="531360"/>
       </dsp:txXfrm>
     </dsp:sp>
-    <dsp:sp modelId="{97E08C18-C4B8-4ADF-80F6-3405C893E2EF}">
+    <dsp:sp modelId="{83C7E223-8604-411D-850F-9896621A0F2F}">
       <dsp:nvSpPr>
         <dsp:cNvPr id="0" name=""/>
         <dsp:cNvSpPr/>
       </dsp:nvSpPr>
       <dsp:spPr>
         <a:xfrm>
-          <a:off x="0" y="912300"/>
-          <a:ext cx="6400800" cy="378000"/>
+          <a:off x="0" y="1940910"/>
+          <a:ext cx="8686800" cy="737100"/>
         </a:xfrm>
         <a:prstGeom prst="rect">
           <a:avLst/>
@@ -1300,16 +2003,45 @@
         </a:effectRef>
         <a:fontRef idx="minor"/>
       </dsp:style>
+      <dsp:txBody>
+        <a:bodyPr spcFirstLastPara="0" vert="horz" wrap="square" lIns="674192" tIns="374904" rIns="674192" bIns="128016" numCol="1" spcCol="1270" anchor="t" anchorCtr="0">
+          <a:noAutofit/>
+        </a:bodyPr>
+        <a:lstStyle/>
+        <a:p>
+          <a:pPr marL="171450" lvl="1" indent="-171450" algn="l" defTabSz="800100">
+            <a:lnSpc>
+              <a:spcPct val="90000"/>
+            </a:lnSpc>
+            <a:spcBef>
+              <a:spcPct val="0"/>
+            </a:spcBef>
+            <a:spcAft>
+              <a:spcPct val="15000"/>
+            </a:spcAft>
+            <a:buChar char="••"/>
+          </a:pPr>
+          <a:r>
+            <a:rPr lang="en-US" sz="1800" kern="1200" dirty="0" smtClean="0"/>
+            <a:t> the buses are not as reliable as needed by the passengers </a:t>
+          </a:r>
+          <a:endParaRPr lang="en-US" sz="1800" kern="1200" dirty="0"/>
+        </a:p>
+      </dsp:txBody>
+      <dsp:txXfrm>
+        <a:off x="0" y="1940910"/>
+        <a:ext cx="8686800" cy="737100"/>
+      </dsp:txXfrm>
     </dsp:sp>
-    <dsp:sp modelId="{C73A8D99-D548-4FBA-90A5-1413658EED22}">
+    <dsp:sp modelId="{00413630-CD6F-4285-B5A4-275B8238A3C6}">
       <dsp:nvSpPr>
         <dsp:cNvPr id="0" name=""/>
         <dsp:cNvSpPr/>
       </dsp:nvSpPr>
       <dsp:spPr>
         <a:xfrm>
-          <a:off x="320040" y="690899"/>
-          <a:ext cx="4480560" cy="442800"/>
+          <a:off x="434340" y="1675230"/>
+          <a:ext cx="6080760" cy="531360"/>
         </a:xfrm>
         <a:prstGeom prst="roundRect">
           <a:avLst/>
@@ -1350,12 +2082,12 @@
         </a:fontRef>
       </dsp:style>
       <dsp:txBody>
-        <a:bodyPr spcFirstLastPara="0" vert="horz" wrap="square" lIns="169355" tIns="0" rIns="169355" bIns="0" numCol="1" spcCol="1270" anchor="ctr" anchorCtr="0">
+        <a:bodyPr spcFirstLastPara="0" vert="horz" wrap="square" lIns="229838" tIns="0" rIns="229838" bIns="0" numCol="1" spcCol="1270" anchor="ctr" anchorCtr="0">
           <a:noAutofit/>
         </a:bodyPr>
         <a:lstStyle/>
         <a:p>
-          <a:pPr lvl="0" algn="l" defTabSz="666750">
+          <a:pPr lvl="0" algn="l" defTabSz="800100">
             <a:lnSpc>
               <a:spcPct val="90000"/>
             </a:lnSpc>
@@ -1366,23 +2098,27 @@
               <a:spcPct val="35000"/>
             </a:spcAft>
           </a:pPr>
-          <a:endParaRPr lang="en-US" sz="1500" kern="1200"/>
+          <a:r>
+            <a:rPr lang="en-US" sz="1800" kern="1200" dirty="0" smtClean="0"/>
+            <a:t>The main Issue:</a:t>
+          </a:r>
+          <a:endParaRPr lang="en-US" sz="1800" kern="1200" dirty="0"/>
         </a:p>
       </dsp:txBody>
       <dsp:txXfrm>
-        <a:off x="320040" y="690899"/>
-        <a:ext cx="4480560" cy="442800"/>
+        <a:off x="434340" y="1675230"/>
+        <a:ext cx="6080760" cy="531360"/>
       </dsp:txXfrm>
     </dsp:sp>
-    <dsp:sp modelId="{E1A35D26-FE76-4034-A3BB-EDBFAE5491D3}">
+    <dsp:sp modelId="{E02ECDBA-6982-45A0-87B9-6E788424EB4C}">
       <dsp:nvSpPr>
         <dsp:cNvPr id="0" name=""/>
         <dsp:cNvSpPr/>
       </dsp:nvSpPr>
       <dsp:spPr>
         <a:xfrm>
-          <a:off x="0" y="1592700"/>
-          <a:ext cx="6400800" cy="378000"/>
+          <a:off x="0" y="3040890"/>
+          <a:ext cx="8686800" cy="737100"/>
         </a:xfrm>
         <a:prstGeom prst="rect">
           <a:avLst/>
@@ -1421,16 +2157,45 @@
         </a:effectRef>
         <a:fontRef idx="minor"/>
       </dsp:style>
+      <dsp:txBody>
+        <a:bodyPr spcFirstLastPara="0" vert="horz" wrap="square" lIns="674192" tIns="374904" rIns="674192" bIns="128016" numCol="1" spcCol="1270" anchor="t" anchorCtr="0">
+          <a:noAutofit/>
+        </a:bodyPr>
+        <a:lstStyle/>
+        <a:p>
+          <a:pPr marL="171450" lvl="1" indent="-171450" algn="l" defTabSz="800100">
+            <a:lnSpc>
+              <a:spcPct val="90000"/>
+            </a:lnSpc>
+            <a:spcBef>
+              <a:spcPct val="0"/>
+            </a:spcBef>
+            <a:spcAft>
+              <a:spcPct val="15000"/>
+            </a:spcAft>
+            <a:buChar char="••"/>
+          </a:pPr>
+          <a:r>
+            <a:rPr lang="en-US" sz="1800" kern="1200" dirty="0" smtClean="0"/>
+            <a:t>Create a program that will do the following : </a:t>
+          </a:r>
+          <a:endParaRPr lang="en-US" sz="1800" kern="1200" dirty="0"/>
+        </a:p>
+      </dsp:txBody>
+      <dsp:txXfrm>
+        <a:off x="0" y="3040890"/>
+        <a:ext cx="8686800" cy="737100"/>
+      </dsp:txXfrm>
     </dsp:sp>
-    <dsp:sp modelId="{EBD7D697-3674-426C-A8D3-2E8F0E9669A1}">
+    <dsp:sp modelId="{BFC5CB00-4EAD-440C-B68A-FD1E0A63E1E7}">
       <dsp:nvSpPr>
         <dsp:cNvPr id="0" name=""/>
         <dsp:cNvSpPr/>
       </dsp:nvSpPr>
       <dsp:spPr>
         <a:xfrm>
-          <a:off x="320040" y="1371300"/>
-          <a:ext cx="4480560" cy="442800"/>
+          <a:off x="537326" y="2762250"/>
+          <a:ext cx="5919559" cy="531360"/>
         </a:xfrm>
         <a:prstGeom prst="roundRect">
           <a:avLst/>
@@ -1471,12 +2236,12 @@
         </a:fontRef>
       </dsp:style>
       <dsp:txBody>
-        <a:bodyPr spcFirstLastPara="0" vert="horz" wrap="square" lIns="169355" tIns="0" rIns="169355" bIns="0" numCol="1" spcCol="1270" anchor="ctr" anchorCtr="0">
+        <a:bodyPr spcFirstLastPara="0" vert="horz" wrap="square" lIns="229838" tIns="0" rIns="229838" bIns="0" numCol="1" spcCol="1270" anchor="ctr" anchorCtr="0">
           <a:noAutofit/>
         </a:bodyPr>
         <a:lstStyle/>
         <a:p>
-          <a:pPr lvl="0" algn="l" defTabSz="666750">
+          <a:pPr lvl="0" algn="l" defTabSz="800100">
             <a:lnSpc>
               <a:spcPct val="90000"/>
             </a:lnSpc>
@@ -1487,12 +2252,370 @@
               <a:spcPct val="35000"/>
             </a:spcAft>
           </a:pPr>
-          <a:endParaRPr lang="en-US" sz="1500" kern="1200"/>
+          <a:r>
+            <a:rPr lang="en-US" sz="1800" kern="1200" dirty="0" smtClean="0"/>
+            <a:t>The Solution :</a:t>
+          </a:r>
+          <a:endParaRPr lang="en-US" sz="1800" kern="1200" dirty="0"/>
         </a:p>
       </dsp:txBody>
       <dsp:txXfrm>
-        <a:off x="320040" y="1371300"/>
-        <a:ext cx="4480560" cy="442800"/>
+        <a:off x="537326" y="2762250"/>
+        <a:ext cx="5919559" cy="531360"/>
+      </dsp:txXfrm>
+    </dsp:sp>
+    <dsp:sp modelId="{792B327A-87F9-4C15-8E9E-43F0FAEA00FB}">
+      <dsp:nvSpPr>
+        <dsp:cNvPr id="0" name=""/>
+        <dsp:cNvSpPr/>
+      </dsp:nvSpPr>
+      <dsp:spPr>
+        <a:xfrm>
+          <a:off x="0" y="4140870"/>
+          <a:ext cx="8686800" cy="1020600"/>
+        </a:xfrm>
+        <a:prstGeom prst="rect">
+          <a:avLst/>
+        </a:prstGeom>
+        <a:solidFill>
+          <a:schemeClr val="lt1">
+            <a:alpha val="90000"/>
+            <a:hueOff val="0"/>
+            <a:satOff val="0"/>
+            <a:lumOff val="0"/>
+            <a:alphaOff val="0"/>
+          </a:schemeClr>
+        </a:solidFill>
+        <a:ln w="38100" cap="flat" cmpd="sng" algn="ctr">
+          <a:solidFill>
+            <a:schemeClr val="accent1">
+              <a:hueOff val="0"/>
+              <a:satOff val="0"/>
+              <a:lumOff val="0"/>
+              <a:alphaOff val="0"/>
+            </a:schemeClr>
+          </a:solidFill>
+          <a:prstDash val="solid"/>
+        </a:ln>
+        <a:effectLst/>
+      </dsp:spPr>
+      <dsp:style>
+        <a:lnRef idx="2">
+          <a:scrgbClr r="0" g="0" b="0"/>
+        </a:lnRef>
+        <a:fillRef idx="1">
+          <a:scrgbClr r="0" g="0" b="0"/>
+        </a:fillRef>
+        <a:effectRef idx="0">
+          <a:scrgbClr r="0" g="0" b="0"/>
+        </a:effectRef>
+        <a:fontRef idx="minor"/>
+      </dsp:style>
+      <dsp:txBody>
+        <a:bodyPr spcFirstLastPara="0" vert="horz" wrap="square" lIns="674192" tIns="374904" rIns="674192" bIns="128016" numCol="1" spcCol="1270" anchor="t" anchorCtr="0">
+          <a:noAutofit/>
+        </a:bodyPr>
+        <a:lstStyle/>
+        <a:p>
+          <a:pPr marL="171450" lvl="1" indent="-171450" algn="l" defTabSz="800100">
+            <a:lnSpc>
+              <a:spcPct val="90000"/>
+            </a:lnSpc>
+            <a:spcBef>
+              <a:spcPct val="0"/>
+            </a:spcBef>
+            <a:spcAft>
+              <a:spcPct val="15000"/>
+            </a:spcAft>
+            <a:buChar char="••"/>
+          </a:pPr>
+          <a:r>
+            <a:rPr lang="en-US" sz="1800" kern="1200" dirty="0" smtClean="0"/>
+            <a:t>When last bus left. </a:t>
+          </a:r>
+          <a:endParaRPr lang="en-US" sz="1800" kern="1200" dirty="0"/>
+        </a:p>
+        <a:p>
+          <a:pPr marL="171450" lvl="1" indent="-171450" algn="l" defTabSz="800100">
+            <a:lnSpc>
+              <a:spcPct val="90000"/>
+            </a:lnSpc>
+            <a:spcBef>
+              <a:spcPct val="0"/>
+            </a:spcBef>
+            <a:spcAft>
+              <a:spcPct val="15000"/>
+            </a:spcAft>
+            <a:buChar char="••"/>
+          </a:pPr>
+          <a:r>
+            <a:rPr lang="en-US" sz="1800" kern="1200" dirty="0" smtClean="0"/>
+            <a:t>When the next bus is due.</a:t>
+          </a:r>
+          <a:endParaRPr lang="en-US" sz="1800" kern="1200" dirty="0"/>
+        </a:p>
+      </dsp:txBody>
+      <dsp:txXfrm>
+        <a:off x="0" y="4140870"/>
+        <a:ext cx="8686800" cy="1020600"/>
+      </dsp:txXfrm>
+    </dsp:sp>
+    <dsp:sp modelId="{FCCB04ED-DEAF-4E79-BABB-FD4A6BF7C968}">
+      <dsp:nvSpPr>
+        <dsp:cNvPr id="0" name=""/>
+        <dsp:cNvSpPr/>
+      </dsp:nvSpPr>
+      <dsp:spPr>
+        <a:xfrm>
+          <a:off x="2105871" y="3916678"/>
+          <a:ext cx="5812902" cy="531360"/>
+        </a:xfrm>
+        <a:prstGeom prst="roundRect">
+          <a:avLst/>
+        </a:prstGeom>
+        <a:solidFill>
+          <a:schemeClr val="accent1">
+            <a:hueOff val="0"/>
+            <a:satOff val="0"/>
+            <a:lumOff val="0"/>
+            <a:alphaOff val="0"/>
+          </a:schemeClr>
+        </a:solidFill>
+        <a:ln w="38100" cap="flat" cmpd="sng" algn="ctr">
+          <a:solidFill>
+            <a:schemeClr val="lt1">
+              <a:hueOff val="0"/>
+              <a:satOff val="0"/>
+              <a:lumOff val="0"/>
+              <a:alphaOff val="0"/>
+            </a:schemeClr>
+          </a:solidFill>
+          <a:prstDash val="solid"/>
+        </a:ln>
+        <a:effectLst/>
+      </dsp:spPr>
+      <dsp:style>
+        <a:lnRef idx="2">
+          <a:scrgbClr r="0" g="0" b="0"/>
+        </a:lnRef>
+        <a:fillRef idx="1">
+          <a:scrgbClr r="0" g="0" b="0"/>
+        </a:fillRef>
+        <a:effectRef idx="0">
+          <a:scrgbClr r="0" g="0" b="0"/>
+        </a:effectRef>
+        <a:fontRef idx="minor">
+          <a:schemeClr val="lt1"/>
+        </a:fontRef>
+      </dsp:style>
+      <dsp:txBody>
+        <a:bodyPr spcFirstLastPara="0" vert="horz" wrap="square" lIns="229838" tIns="0" rIns="229838" bIns="0" numCol="1" spcCol="1270" anchor="ctr" anchorCtr="0">
+          <a:noAutofit/>
+        </a:bodyPr>
+        <a:lstStyle/>
+        <a:p>
+          <a:pPr lvl="0" algn="l" defTabSz="800100">
+            <a:lnSpc>
+              <a:spcPct val="90000"/>
+            </a:lnSpc>
+            <a:spcBef>
+              <a:spcPct val="0"/>
+            </a:spcBef>
+            <a:spcAft>
+              <a:spcPct val="35000"/>
+            </a:spcAft>
+          </a:pPr>
+          <a:r>
+            <a:rPr lang="en-US" sz="1800" kern="1200" dirty="0" smtClean="0"/>
+            <a:t>Give the knowledge of Buses (for the passenger)</a:t>
+          </a:r>
+          <a:endParaRPr lang="en-US" sz="1800" kern="1200" dirty="0"/>
+        </a:p>
+      </dsp:txBody>
+      <dsp:txXfrm>
+        <a:off x="2105871" y="3916678"/>
+        <a:ext cx="5812902" cy="531360"/>
+      </dsp:txXfrm>
+    </dsp:sp>
+    <dsp:sp modelId="{F91EA70D-CE80-424A-A2E9-DA4113EF35A4}">
+      <dsp:nvSpPr>
+        <dsp:cNvPr id="0" name=""/>
+        <dsp:cNvSpPr/>
+      </dsp:nvSpPr>
+      <dsp:spPr>
+        <a:xfrm>
+          <a:off x="0" y="5532600"/>
+          <a:ext cx="8686800" cy="1020600"/>
+        </a:xfrm>
+        <a:prstGeom prst="rect">
+          <a:avLst/>
+        </a:prstGeom>
+        <a:solidFill>
+          <a:schemeClr val="lt1">
+            <a:alpha val="90000"/>
+            <a:hueOff val="0"/>
+            <a:satOff val="0"/>
+            <a:lumOff val="0"/>
+            <a:alphaOff val="0"/>
+          </a:schemeClr>
+        </a:solidFill>
+        <a:ln w="38100" cap="flat" cmpd="sng" algn="ctr">
+          <a:solidFill>
+            <a:schemeClr val="accent1">
+              <a:hueOff val="0"/>
+              <a:satOff val="0"/>
+              <a:lumOff val="0"/>
+              <a:alphaOff val="0"/>
+            </a:schemeClr>
+          </a:solidFill>
+          <a:prstDash val="solid"/>
+        </a:ln>
+        <a:effectLst/>
+      </dsp:spPr>
+      <dsp:style>
+        <a:lnRef idx="2">
+          <a:scrgbClr r="0" g="0" b="0"/>
+        </a:lnRef>
+        <a:fillRef idx="1">
+          <a:scrgbClr r="0" g="0" b="0"/>
+        </a:fillRef>
+        <a:effectRef idx="0">
+          <a:scrgbClr r="0" g="0" b="0"/>
+        </a:effectRef>
+        <a:fontRef idx="minor"/>
+      </dsp:style>
+      <dsp:txBody>
+        <a:bodyPr spcFirstLastPara="0" vert="horz" wrap="square" lIns="674192" tIns="374904" rIns="674192" bIns="128016" numCol="1" spcCol="1270" anchor="t" anchorCtr="0">
+          <a:noAutofit/>
+        </a:bodyPr>
+        <a:lstStyle/>
+        <a:p>
+          <a:pPr marL="171450" lvl="1" indent="-171450" algn="l" defTabSz="800100">
+            <a:lnSpc>
+              <a:spcPct val="90000"/>
+            </a:lnSpc>
+            <a:spcBef>
+              <a:spcPct val="0"/>
+            </a:spcBef>
+            <a:spcAft>
+              <a:spcPct val="15000"/>
+            </a:spcAft>
+            <a:buChar char="••"/>
+          </a:pPr>
+          <a:r>
+            <a:rPr lang="en-US" sz="1800" kern="1200" dirty="0" smtClean="0"/>
+            <a:t>How many potential passengers are at the stops?</a:t>
+          </a:r>
+          <a:endParaRPr lang="en-US" sz="1800" kern="1200" dirty="0"/>
+        </a:p>
+        <a:p>
+          <a:pPr marL="171450" lvl="1" indent="-171450" algn="l" defTabSz="800100">
+            <a:lnSpc>
+              <a:spcPct val="90000"/>
+            </a:lnSpc>
+            <a:spcBef>
+              <a:spcPct val="0"/>
+            </a:spcBef>
+            <a:spcAft>
+              <a:spcPct val="15000"/>
+            </a:spcAft>
+            <a:buChar char="••"/>
+          </a:pPr>
+          <a:r>
+            <a:rPr lang="en-US" sz="1800" kern="1200" dirty="0" smtClean="0"/>
+            <a:t>How many passengers are on the buses ?</a:t>
+          </a:r>
+          <a:endParaRPr lang="en-US" sz="1800" kern="1200" dirty="0"/>
+        </a:p>
+      </dsp:txBody>
+      <dsp:txXfrm>
+        <a:off x="0" y="5532600"/>
+        <a:ext cx="8686800" cy="1020600"/>
+      </dsp:txXfrm>
+    </dsp:sp>
+    <dsp:sp modelId="{679ECB79-E4C8-45C1-BCF5-7A96F922AE3A}">
+      <dsp:nvSpPr>
+        <dsp:cNvPr id="0" name=""/>
+        <dsp:cNvSpPr/>
+      </dsp:nvSpPr>
+      <dsp:spPr>
+        <a:xfrm>
+          <a:off x="2193616" y="5196840"/>
+          <a:ext cx="6080760" cy="531360"/>
+        </a:xfrm>
+        <a:prstGeom prst="roundRect">
+          <a:avLst/>
+        </a:prstGeom>
+        <a:solidFill>
+          <a:schemeClr val="accent1">
+            <a:hueOff val="0"/>
+            <a:satOff val="0"/>
+            <a:lumOff val="0"/>
+            <a:alphaOff val="0"/>
+          </a:schemeClr>
+        </a:solidFill>
+        <a:ln w="38100" cap="flat" cmpd="sng" algn="ctr">
+          <a:solidFill>
+            <a:schemeClr val="lt1">
+              <a:hueOff val="0"/>
+              <a:satOff val="0"/>
+              <a:lumOff val="0"/>
+              <a:alphaOff val="0"/>
+            </a:schemeClr>
+          </a:solidFill>
+          <a:prstDash val="solid"/>
+        </a:ln>
+        <a:effectLst/>
+      </dsp:spPr>
+      <dsp:style>
+        <a:lnRef idx="2">
+          <a:scrgbClr r="0" g="0" b="0"/>
+        </a:lnRef>
+        <a:fillRef idx="1">
+          <a:scrgbClr r="0" g="0" b="0"/>
+        </a:fillRef>
+        <a:effectRef idx="0">
+          <a:scrgbClr r="0" g="0" b="0"/>
+        </a:effectRef>
+        <a:fontRef idx="minor">
+          <a:schemeClr val="lt1"/>
+        </a:fontRef>
+      </dsp:style>
+      <dsp:txBody>
+        <a:bodyPr spcFirstLastPara="0" vert="horz" wrap="square" lIns="229838" tIns="0" rIns="229838" bIns="0" numCol="1" spcCol="1270" anchor="ctr" anchorCtr="0">
+          <a:noAutofit/>
+        </a:bodyPr>
+        <a:lstStyle/>
+        <a:p>
+          <a:pPr lvl="0" algn="l" defTabSz="800100">
+            <a:lnSpc>
+              <a:spcPct val="90000"/>
+            </a:lnSpc>
+            <a:spcBef>
+              <a:spcPct val="0"/>
+            </a:spcBef>
+            <a:spcAft>
+              <a:spcPct val="35000"/>
+            </a:spcAft>
+          </a:pPr>
+          <a:r>
+            <a:rPr lang="en-US" sz="1800" kern="1200" dirty="0" smtClean="0"/>
+            <a:t>Provide </a:t>
+          </a:r>
+          <a:r>
+            <a:rPr lang="en-US" sz="1800" i="1" kern="1200" dirty="0" smtClean="0"/>
+            <a:t>Passenger Information </a:t>
+          </a:r>
+          <a:r>
+            <a:rPr lang="en-US" sz="1800" kern="1200" dirty="0" smtClean="0"/>
+            <a:t>(for the administrators). </a:t>
+          </a:r>
+          <a:endParaRPr lang="en-US" sz="1800" kern="1200" dirty="0"/>
+        </a:p>
+      </dsp:txBody>
+      <dsp:txXfrm>
+        <a:off x="2193616" y="5196840"/>
+        <a:ext cx="6080760" cy="531360"/>
       </dsp:txXfrm>
     </dsp:sp>
   </dsp:spTree>
@@ -2840,7 +3963,8 @@
           <a:p>
             <a:fld id="{A201E73C-6F5C-424C-8AAA-DFB631002592}" type="datetimeFigureOut">
               <a:rPr lang="en-US" smtClean="0"/>
-              <a:t>3/16/2012</a:t>
+              <a:pPr/>
+              <a:t>3/20/2012</a:t>
             </a:fld>
             <a:endParaRPr lang="en-US"/>
           </a:p>
@@ -3001,6 +4125,7 @@
           <a:p>
             <a:fld id="{D2C20754-2859-45A8-8015-4CC934F73286}" type="slidenum">
               <a:rPr lang="en-US" smtClean="0"/>
+              <a:pPr/>
               <a:t>‹#›</a:t>
             </a:fld>
             <a:endParaRPr lang="en-US"/>
@@ -3172,7 +4297,8 @@
           <a:p>
             <a:fld id="{D2C20754-2859-45A8-8015-4CC934F73286}" type="slidenum">
               <a:rPr lang="en-US" smtClean="0"/>
-              <a:t>2</a:t>
+              <a:pPr/>
+              <a:t>1</a:t>
             </a:fld>
             <a:endParaRPr lang="en-US"/>
           </a:p>
@@ -3220,7 +4346,8 @@
           <a:p>
             <a:fld id="{02457259-08D9-41C8-9292-106002D02644}" type="datetime1">
               <a:rPr lang="en-US" smtClean="0"/>
-              <a:t>3/16/2012</a:t>
+              <a:pPr/>
+              <a:t>3/20/2012</a:t>
             </a:fld>
             <a:endParaRPr lang="en-US"/>
           </a:p>
@@ -3262,6 +4389,7 @@
           <a:p>
             <a:fld id="{5AA9F0AF-4E0E-4166-BABF-1BA966AE8628}" type="slidenum">
               <a:rPr lang="en-US" smtClean="0"/>
+              <a:pPr/>
               <a:t>‹#›</a:t>
             </a:fld>
             <a:endParaRPr lang="en-US" dirty="0"/>
@@ -3392,7 +4520,8 @@
           <a:p>
             <a:fld id="{325F140D-A13A-46FC-9F61-D90FA4B17A95}" type="datetime1">
               <a:rPr lang="en-US" smtClean="0"/>
-              <a:t>3/16/2012</a:t>
+              <a:pPr/>
+              <a:t>3/20/2012</a:t>
             </a:fld>
             <a:endParaRPr lang="en-US"/>
           </a:p>
@@ -3634,7 +4763,8 @@
           <a:p>
             <a:fld id="{703E8025-8E2D-4D0D-AD35-AEF7F9FA2A5C}" type="datetime1">
               <a:rPr lang="en-US" smtClean="0"/>
-              <a:t>3/16/2012</a:t>
+              <a:pPr/>
+              <a:t>3/20/2012</a:t>
             </a:fld>
             <a:endParaRPr lang="en-US"/>
           </a:p>
@@ -3918,7 +5048,8 @@
           <a:p>
             <a:fld id="{2F3B8C18-4A8A-4088-A495-52BD160FF0F0}" type="datetime1">
               <a:rPr lang="en-US" smtClean="0"/>
-              <a:t>3/16/2012</a:t>
+              <a:pPr/>
+              <a:t>3/20/2012</a:t>
             </a:fld>
             <a:endParaRPr lang="en-US"/>
           </a:p>
@@ -4336,7 +5467,8 @@
           <a:p>
             <a:fld id="{4B29AFA3-FC8B-4265-9A29-01AB897EBB77}" type="datetime1">
               <a:rPr lang="en-US" smtClean="0"/>
-              <a:t>3/16/2012</a:t>
+              <a:pPr/>
+              <a:t>3/20/2012</a:t>
             </a:fld>
             <a:endParaRPr lang="en-US"/>
           </a:p>
@@ -4450,7 +5582,8 @@
           <a:p>
             <a:fld id="{CD1C773E-B9F2-4B0C-8C62-20798607D466}" type="datetime1">
               <a:rPr lang="en-US" smtClean="0"/>
-              <a:t>3/16/2012</a:t>
+              <a:pPr/>
+              <a:t>3/20/2012</a:t>
             </a:fld>
             <a:endParaRPr lang="en-US"/>
           </a:p>
@@ -4541,7 +5674,8 @@
           <a:p>
             <a:fld id="{911F04A4-BB92-43C7-BD7C-B26625321B3F}" type="datetime1">
               <a:rPr lang="en-US" smtClean="0"/>
-              <a:t>3/16/2012</a:t>
+              <a:pPr/>
+              <a:t>3/20/2012</a:t>
             </a:fld>
             <a:endParaRPr lang="en-US"/>
           </a:p>
@@ -4814,7 +5948,8 @@
           <a:p>
             <a:fld id="{081C5804-C814-4EDD-980D-EFFDC181840F}" type="datetime1">
               <a:rPr lang="en-US" smtClean="0"/>
-              <a:t>3/16/2012</a:t>
+              <a:pPr/>
+              <a:t>3/20/2012</a:t>
             </a:fld>
             <a:endParaRPr lang="en-US"/>
           </a:p>
@@ -5063,7 +6198,8 @@
           <a:p>
             <a:fld id="{CB1B9C3A-9A4F-4163-A9C5-F55B52C1F6F4}" type="datetime1">
               <a:rPr lang="en-US" smtClean="0"/>
-              <a:t>3/16/2012</a:t>
+              <a:pPr/>
+              <a:t>3/20/2012</a:t>
             </a:fld>
             <a:endParaRPr lang="en-US"/>
           </a:p>
@@ -5291,7 +6427,8 @@
           <a:p>
             <a:fld id="{491CEF5D-9F60-4BCC-8A7A-292C75E624A5}" type="datetime1">
               <a:rPr lang="en-US" smtClean="0"/>
-              <a:t>3/16/2012</a:t>
+              <a:pPr/>
+              <a:t>3/20/2012</a:t>
             </a:fld>
             <a:endParaRPr lang="en-US"/>
           </a:p>
@@ -5709,129 +6846,6 @@
           </a:p>
         </p:txBody>
       </p:sp>
-      <p:sp>
-        <p:nvSpPr>
-          <p:cNvPr id="4" name="Slide Number Placeholder 3"/>
-          <p:cNvSpPr>
-            <a:spLocks noGrp="1"/>
-          </p:cNvSpPr>
-          <p:nvPr>
-            <p:ph type="sldNum" sz="quarter" idx="12"/>
-          </p:nvPr>
-        </p:nvSpPr>
-        <p:spPr/>
-        <p:txBody>
-          <a:bodyPr/>
-          <a:lstStyle/>
-          <a:p>
-            <a:fld id="{5AA9F0AF-4E0E-4166-BABF-1BA966AE8628}" type="slidenum">
-              <a:rPr lang="en-US" smtClean="0"/>
-              <a:t>1</a:t>
-            </a:fld>
-            <a:endParaRPr lang="en-US" dirty="0"/>
-          </a:p>
-        </p:txBody>
-      </p:sp>
-      <p:graphicFrame>
-        <p:nvGraphicFramePr>
-          <p:cNvPr id="5" name="Object 4"/>
-          <p:cNvGraphicFramePr>
-            <a:graphicFrameLocks/>
-          </p:cNvGraphicFramePr>
-          <p:nvPr/>
-        </p:nvGraphicFramePr>
-        <p:xfrm>
-          <a:off x="1524000" y="838200"/>
-          <a:ext cx="6096000" cy="4064000"/>
-        </p:xfrm>
-        <a:graphic>
-          <a:graphicData uri="http://schemas.openxmlformats.org/presentationml/2006/ole">
-            <p:oleObj spid="_x0000_s2050" name="Acrobat Document" r:id="rId3" imgW="0" imgH="0" progId="AcroExch.Document.7">
-              <p:embed/>
-            </p:oleObj>
-          </a:graphicData>
-        </a:graphic>
-      </p:graphicFrame>
-    </p:spTree>
-  </p:cSld>
-  <p:clrMapOvr>
-    <a:masterClrMapping/>
-  </p:clrMapOvr>
-  <p:timing>
-    <p:tnLst>
-      <p:par>
-        <p:cTn id="1" dur="indefinite" restart="never" nodeType="tmRoot"/>
-      </p:par>
-    </p:tnLst>
-  </p:timing>
-</p:sld>
-</file>
-
-<file path=ppt/slides/slide2.xml><?xml version="1.0" encoding="utf-8"?>
-<p:sld xmlns:a="http://schemas.openxmlformats.org/drawingml/2006/main" xmlns:r="http://schemas.openxmlformats.org/officeDocument/2006/relationships" xmlns:p="http://schemas.openxmlformats.org/presentationml/2006/main">
-  <p:cSld>
-    <p:spTree>
-      <p:nvGrpSpPr>
-        <p:cNvPr id="1" name=""/>
-        <p:cNvGrpSpPr/>
-        <p:nvPr/>
-      </p:nvGrpSpPr>
-      <p:grpSpPr>
-        <a:xfrm>
-          <a:off x="0" y="0"/>
-          <a:ext cx="0" cy="0"/>
-          <a:chOff x="0" y="0"/>
-          <a:chExt cx="0" cy="0"/>
-        </a:xfrm>
-      </p:grpSpPr>
-      <p:sp>
-        <p:nvSpPr>
-          <p:cNvPr id="2" name="Title 1"/>
-          <p:cNvSpPr>
-            <a:spLocks noGrp="1"/>
-          </p:cNvSpPr>
-          <p:nvPr>
-            <p:ph type="ctrTitle" idx="4294967295"/>
-          </p:nvPr>
-        </p:nvSpPr>
-        <p:spPr>
-          <a:xfrm>
-            <a:off x="685800" y="2130425"/>
-            <a:ext cx="7772400" cy="1470025"/>
-          </a:xfrm>
-        </p:spPr>
-        <p:txBody>
-          <a:bodyPr/>
-          <a:lstStyle/>
-          <a:p>
-            <a:endParaRPr lang="en-US" dirty="0"/>
-          </a:p>
-        </p:txBody>
-      </p:sp>
-      <p:sp>
-        <p:nvSpPr>
-          <p:cNvPr id="3" name="Subtitle 2"/>
-          <p:cNvSpPr>
-            <a:spLocks noGrp="1"/>
-          </p:cNvSpPr>
-          <p:nvPr>
-            <p:ph type="subTitle" idx="4294967295"/>
-          </p:nvPr>
-        </p:nvSpPr>
-        <p:spPr>
-          <a:xfrm>
-            <a:off x="1371600" y="3886200"/>
-            <a:ext cx="6400800" cy="1752600"/>
-          </a:xfrm>
-        </p:spPr>
-        <p:txBody>
-          <a:bodyPr/>
-          <a:lstStyle/>
-          <a:p>
-            <a:endParaRPr lang="en-US" dirty="0"/>
-          </a:p>
-        </p:txBody>
-      </p:sp>
       <p:graphicFrame>
         <p:nvGraphicFramePr>
           <p:cNvPr id="5" name="SmartArt Placeholder 4"/>
@@ -5843,8 +6857,8 @@
           </p:nvPr>
         </p:nvGraphicFramePr>
         <p:xfrm>
-          <a:off x="1371600" y="152400"/>
-          <a:ext cx="6400800" cy="1981200"/>
+          <a:off x="228600" y="152400"/>
+          <a:ext cx="8686800" cy="6553200"/>
         </p:xfrm>
         <a:graphic>
           <a:graphicData uri="http://schemas.openxmlformats.org/drawingml/2006/diagram">
@@ -5867,14 +6881,6 @@
           <a:bodyPr/>
           <a:lstStyle/>
           <a:p>
-            <a:fld id="{5AA9F0AF-4E0E-4166-BABF-1BA966AE8628}" type="slidenum">
-              <a:rPr lang="en-US" smtClean="0">
-                <a:solidFill>
-                  <a:schemeClr val="tx1"/>
-                </a:solidFill>
-              </a:rPr>
-              <a:t>2</a:t>
-            </a:fld>
             <a:endParaRPr lang="en-US" dirty="0">
               <a:solidFill>
                 <a:schemeClr val="tx1"/>
@@ -5891,9 +6897,90 @@
   <p:timing>
     <p:tnLst>
       <p:par>
-        <p:cTn id="1" dur="indefinite" restart="never" nodeType="tmRoot"/>
+        <p:cTn id="1" dur="indefinite" restart="never" nodeType="tmRoot">
+          <p:childTnLst>
+            <p:seq concurrent="1" nextAc="seek">
+              <p:cTn id="2" dur="indefinite" nodeType="mainSeq">
+                <p:childTnLst>
+                  <p:par>
+                    <p:cTn id="3" fill="hold">
+                      <p:stCondLst>
+                        <p:cond delay="indefinite"/>
+                      </p:stCondLst>
+                      <p:childTnLst>
+                        <p:par>
+                          <p:cTn id="4" fill="hold">
+                            <p:stCondLst>
+                              <p:cond delay="0"/>
+                            </p:stCondLst>
+                            <p:childTnLst>
+                              <p:par>
+                                <p:cTn id="5" presetID="10" presetClass="entr" presetSubtype="0" fill="hold" grpId="0" nodeType="clickEffect">
+                                  <p:stCondLst>
+                                    <p:cond delay="0"/>
+                                  </p:stCondLst>
+                                  <p:childTnLst>
+                                    <p:set>
+                                      <p:cBhvr>
+                                        <p:cTn id="6" dur="1" fill="hold">
+                                          <p:stCondLst>
+                                            <p:cond delay="0"/>
+                                          </p:stCondLst>
+                                        </p:cTn>
+                                        <p:tgtEl>
+                                          <p:spTgt spid="5"/>
+                                        </p:tgtEl>
+                                        <p:attrNameLst>
+                                          <p:attrName>style.visibility</p:attrName>
+                                        </p:attrNameLst>
+                                      </p:cBhvr>
+                                      <p:to>
+                                        <p:strVal val="visible"/>
+                                      </p:to>
+                                    </p:set>
+                                    <p:animEffect transition="in" filter="fade">
+                                      <p:cBhvr>
+                                        <p:cTn id="7" dur="500"/>
+                                        <p:tgtEl>
+                                          <p:spTgt spid="5"/>
+                                        </p:tgtEl>
+                                      </p:cBhvr>
+                                    </p:animEffect>
+                                  </p:childTnLst>
+                                </p:cTn>
+                              </p:par>
+                            </p:childTnLst>
+                          </p:cTn>
+                        </p:par>
+                      </p:childTnLst>
+                    </p:cTn>
+                  </p:par>
+                </p:childTnLst>
+              </p:cTn>
+              <p:prevCondLst>
+                <p:cond evt="onPrev" delay="0">
+                  <p:tgtEl>
+                    <p:sldTgt/>
+                  </p:tgtEl>
+                </p:cond>
+              </p:prevCondLst>
+              <p:nextCondLst>
+                <p:cond evt="onNext" delay="0">
+                  <p:tgtEl>
+                    <p:sldTgt/>
+                  </p:tgtEl>
+                </p:cond>
+              </p:nextCondLst>
+            </p:seq>
+          </p:childTnLst>
+        </p:cTn>
       </p:par>
     </p:tnLst>
+    <p:bldLst>
+      <p:bldGraphic spid="5" grpId="0">
+        <p:bldAsOne/>
+      </p:bldGraphic>
+    </p:bldLst>
   </p:timing>
 </p:sld>
 </file>

</xml_diff>